<commit_message>
some more changes to event extraction slides etc.
</commit_message>
<xml_diff>
--- a/slides/pptx/3-entity-extraction.pptx
+++ b/slides/pptx/3-entity-extraction.pptx
@@ -5,7 +5,7 @@
     <p:sldMasterId id="2147483660" r:id="rId1"/>
   </p:sldMasterIdLst>
   <p:notesMasterIdLst>
-    <p:notesMasterId r:id="rId32"/>
+    <p:notesMasterId r:id="rId34"/>
   </p:notesMasterIdLst>
   <p:sldIdLst>
     <p:sldId id="365" r:id="rId2"/>
@@ -29,15 +29,17 @@
     <p:sldId id="353" r:id="rId20"/>
     <p:sldId id="367" r:id="rId21"/>
     <p:sldId id="354" r:id="rId22"/>
-    <p:sldId id="356" r:id="rId23"/>
-    <p:sldId id="357" r:id="rId24"/>
-    <p:sldId id="355" r:id="rId25"/>
-    <p:sldId id="358" r:id="rId26"/>
-    <p:sldId id="359" r:id="rId27"/>
-    <p:sldId id="360" r:id="rId28"/>
-    <p:sldId id="362" r:id="rId29"/>
-    <p:sldId id="363" r:id="rId30"/>
-    <p:sldId id="364" r:id="rId31"/>
+    <p:sldId id="355" r:id="rId23"/>
+    <p:sldId id="368" r:id="rId24"/>
+    <p:sldId id="356" r:id="rId25"/>
+    <p:sldId id="357" r:id="rId26"/>
+    <p:sldId id="358" r:id="rId27"/>
+    <p:sldId id="359" r:id="rId28"/>
+    <p:sldId id="360" r:id="rId29"/>
+    <p:sldId id="362" r:id="rId30"/>
+    <p:sldId id="363" r:id="rId31"/>
+    <p:sldId id="364" r:id="rId32"/>
+    <p:sldId id="369" r:id="rId33"/>
   </p:sldIdLst>
   <p:sldSz cx="9144000" cy="6858000" type="screen4x3"/>
   <p:notesSz cx="6858000" cy="9144000"/>
@@ -566,7 +568,7 @@
           <a:p>
             <a:fld id="{9D3E0FAC-92B7-4344-B8CE-D78B9752AB0B}" type="slidenum">
               <a:rPr lang="en-US" smtClean="0"/>
-              <a:t>23</a:t>
+              <a:t>25</a:t>
             </a:fld>
             <a:endParaRPr lang="en-US"/>
           </a:p>
@@ -661,7 +663,7 @@
           <a:p>
             <a:fld id="{9D3E0FAC-92B7-4344-B8CE-D78B9752AB0B}" type="slidenum">
               <a:rPr lang="en-US" smtClean="0"/>
-              <a:t>25</a:t>
+              <a:t>26</a:t>
             </a:fld>
             <a:endParaRPr lang="en-US"/>
           </a:p>
@@ -748,7 +750,7 @@
           <a:p>
             <a:fld id="{9D3E0FAC-92B7-4344-B8CE-D78B9752AB0B}" type="slidenum">
               <a:rPr lang="en-US" smtClean="0"/>
-              <a:t>27</a:t>
+              <a:t>28</a:t>
             </a:fld>
             <a:endParaRPr lang="en-US"/>
           </a:p>
@@ -8512,7 +8514,7 @@
           <p:cNvPr id="2" name="Title 1">
             <a:extLst>
               <a:ext uri="{FF2B5EF4-FFF2-40B4-BE49-F238E27FC236}">
-                <a16:creationId xmlns:a16="http://schemas.microsoft.com/office/drawing/2014/main" xmlns="" id="{47E09107-4194-4BB3-9118-E9B9EDF2C558}"/>
+                <a16:creationId xmlns="" xmlns:a16="http://schemas.microsoft.com/office/drawing/2014/main" id="{47E09107-4194-4BB3-9118-E9B9EDF2C558}"/>
               </a:ext>
             </a:extLst>
           </p:cNvPr>
@@ -8530,7 +8532,7 @@
           <a:p>
             <a:r>
               <a:rPr lang="en-US"/>
-              <a:t>Entity Extraction aka Named Entity Recognition (NER)</a:t>
+              <a:t>Entity Extraction</a:t>
             </a:r>
           </a:p>
         </p:txBody>
@@ -8540,7 +8542,7 @@
           <p:cNvPr id="7" name="Content Placeholder 6">
             <a:extLst>
               <a:ext uri="{FF2B5EF4-FFF2-40B4-BE49-F238E27FC236}">
-                <a16:creationId xmlns:a16="http://schemas.microsoft.com/office/drawing/2014/main" xmlns="" id="{55AA5913-BC8F-49AE-83AD-A535765E7CC1}"/>
+                <a16:creationId xmlns="" xmlns:a16="http://schemas.microsoft.com/office/drawing/2014/main" id="{55AA5913-BC8F-49AE-83AD-A535765E7CC1}"/>
               </a:ext>
             </a:extLst>
           </p:cNvPr>
@@ -8554,35 +8556,32 @@
         <p:spPr>
           <a:xfrm>
             <a:off x="628650" y="1825625"/>
-            <a:ext cx="8600694" cy="4351338"/>
-          </a:xfrm>
-        </p:spPr>
-        <p:txBody>
-          <a:bodyPr/>
-          <a:lstStyle/>
-          <a:p>
-            <a:r>
-              <a:rPr lang="en-US"/>
-              <a:t>NER is </a:t>
-            </a:r>
-            <a:r>
-              <a:rPr lang="en-US">
-                <a:solidFill>
-                  <a:srgbClr val="FF0000"/>
-                </a:solidFill>
-              </a:rPr>
-              <a:t>a classic problem </a:t>
-            </a:r>
-            <a:r>
-              <a:rPr lang="en-US"/>
-              <a:t>in the Natural Language Processing (NLP) literature</a:t>
+            <a:ext cx="8337550" cy="4351338"/>
+          </a:xfrm>
+        </p:spPr>
+        <p:txBody>
+          <a:bodyPr>
+            <a:normAutofit/>
+          </a:bodyPr>
+          <a:lstStyle/>
+          <a:p>
+            <a:r>
+              <a:rPr lang="en-US" sz="2400"/>
+              <a:t>More technically known as Named Entity Recognition (NER)</a:t>
+            </a:r>
+            <a:endParaRPr lang="en-US" sz="2400"/>
+          </a:p>
+          <a:p>
+            <a:r>
+              <a:rPr lang="en-US" sz="2400"/>
+              <a:t>NER is a classic problem in the NLP literature</a:t>
             </a:r>
           </a:p>
           <a:p>
             <a:pPr lvl="1"/>
             <a:r>
-              <a:rPr lang="en-US"/>
-              <a:t>Decades of research, with recent methods including deep learning and zero-shot learning</a:t>
+              <a:rPr lang="en-US" sz="2000"/>
+              <a:t>Decades of research, with recent methods including deep learning</a:t>
             </a:r>
           </a:p>
         </p:txBody>
@@ -8592,7 +8591,7 @@
           <p:cNvPr id="3" name="Picture 2">
             <a:extLst>
               <a:ext uri="{FF2B5EF4-FFF2-40B4-BE49-F238E27FC236}">
-                <a16:creationId xmlns:a16="http://schemas.microsoft.com/office/drawing/2014/main" xmlns="" id="{890F1FE2-5119-40AB-8F6D-A56025346D75}"/>
+                <a16:creationId xmlns="" xmlns:a16="http://schemas.microsoft.com/office/drawing/2014/main" id="{890F1FE2-5119-40AB-8F6D-A56025346D75}"/>
               </a:ext>
             </a:extLst>
           </p:cNvPr>
@@ -8609,8 +8608,8 @@
         </p:blipFill>
         <p:spPr>
           <a:xfrm>
-            <a:off x="750570" y="3611879"/>
-            <a:ext cx="7088886" cy="3157136"/>
+            <a:off x="919904" y="3392019"/>
+            <a:ext cx="6556163" cy="2919880"/>
           </a:xfrm>
           <a:prstGeom prst="rect">
             <a:avLst/>
@@ -8622,7 +8621,7 @@
           <p:cNvPr id="8" name="TextBox 7">
             <a:extLst>
               <a:ext uri="{FF2B5EF4-FFF2-40B4-BE49-F238E27FC236}">
-                <a16:creationId xmlns:a16="http://schemas.microsoft.com/office/drawing/2014/main" xmlns="" id="{138EE332-0527-44B9-8D26-43A95831B2A9}"/>
+                <a16:creationId xmlns="" xmlns:a16="http://schemas.microsoft.com/office/drawing/2014/main" id="{138EE332-0527-44B9-8D26-43A95831B2A9}"/>
               </a:ext>
             </a:extLst>
           </p:cNvPr>
@@ -8631,8 +8630,8 @@
         </p:nvSpPr>
         <p:spPr>
           <a:xfrm>
-            <a:off x="6047232" y="6484358"/>
-            <a:ext cx="3096768" cy="369332"/>
+            <a:off x="6570132" y="6484358"/>
+            <a:ext cx="2573867" cy="307777"/>
           </a:xfrm>
           <a:prstGeom prst="rect">
             <a:avLst/>
@@ -8647,7 +8646,7 @@
           <a:p>
             <a:pPr algn="r"/>
             <a:r>
-              <a:rPr lang="en-US">
+              <a:rPr lang="en-US" sz="1400">
                 <a:solidFill>
                   <a:srgbClr val="002060"/>
                 </a:solidFill>
@@ -8699,7 +8698,7 @@
           <p:cNvPr id="2" name="Title 1">
             <a:extLst>
               <a:ext uri="{FF2B5EF4-FFF2-40B4-BE49-F238E27FC236}">
-                <a16:creationId xmlns:a16="http://schemas.microsoft.com/office/drawing/2014/main" xmlns="" id="{47E09107-4194-4BB3-9118-E9B9EDF2C558}"/>
+                <a16:creationId xmlns="" xmlns:a16="http://schemas.microsoft.com/office/drawing/2014/main" id="{47E09107-4194-4BB3-9118-E9B9EDF2C558}"/>
               </a:ext>
             </a:extLst>
           </p:cNvPr>
@@ -8717,7 +8716,7 @@
           <a:p>
             <a:r>
               <a:rPr lang="en-US"/>
-              <a:t>Entity Extraction aka Named Entity Recognition (NER)</a:t>
+              <a:t>Named Entity Recognition (NER)</a:t>
             </a:r>
           </a:p>
         </p:txBody>
@@ -8727,7 +8726,7 @@
           <p:cNvPr id="7" name="Content Placeholder 6">
             <a:extLst>
               <a:ext uri="{FF2B5EF4-FFF2-40B4-BE49-F238E27FC236}">
-                <a16:creationId xmlns:a16="http://schemas.microsoft.com/office/drawing/2014/main" xmlns="" id="{55AA5913-BC8F-49AE-83AD-A535765E7CC1}"/>
+                <a16:creationId xmlns="" xmlns:a16="http://schemas.microsoft.com/office/drawing/2014/main" id="{55AA5913-BC8F-49AE-83AD-A535765E7CC1}"/>
               </a:ext>
             </a:extLst>
           </p:cNvPr>
@@ -8745,53 +8744,27 @@
           </a:xfrm>
         </p:spPr>
         <p:txBody>
-          <a:bodyPr/>
-          <a:lstStyle/>
-          <a:p>
-            <a:r>
-              <a:rPr lang="en-US"/>
-              <a:t>NER is </a:t>
-            </a:r>
-            <a:r>
-              <a:rPr lang="en-US">
-                <a:solidFill>
-                  <a:srgbClr val="FF0000"/>
-                </a:solidFill>
-              </a:rPr>
-              <a:t>a classic problem </a:t>
-            </a:r>
-            <a:r>
-              <a:rPr lang="en-US"/>
-              <a:t>in the Natural Language Processing (NLP) literature</a:t>
+          <a:bodyPr>
+            <a:normAutofit/>
+          </a:bodyPr>
+          <a:lstStyle/>
+          <a:p>
+            <a:r>
+              <a:rPr lang="en-US" sz="2400"/>
+              <a:t>NER is a classic problem in the NLP literature</a:t>
             </a:r>
           </a:p>
           <a:p>
             <a:pPr lvl="1"/>
             <a:r>
-              <a:rPr lang="en-US"/>
-              <a:t>Decades of research, with recent methods including deep learning and zero-shot learning</a:t>
-            </a:r>
-          </a:p>
-          <a:p>
-            <a:r>
-              <a:rPr lang="en-US">
-                <a:solidFill>
-                  <a:srgbClr val="FF0000"/>
-                </a:solidFill>
-              </a:rPr>
-              <a:t>Social media </a:t>
-            </a:r>
-            <a:r>
-              <a:rPr lang="en-US"/>
-              <a:t>involves some unique challenges for NER due to </a:t>
-            </a:r>
-            <a:r>
-              <a:rPr lang="en-US">
-                <a:solidFill>
-                  <a:srgbClr val="FF0000"/>
-                </a:solidFill>
-              </a:rPr>
-              <a:t>irregular text</a:t>
+              <a:rPr lang="en-US" sz="2000"/>
+              <a:t>Decades of research, with recent methods including deep </a:t>
+            </a:r>
+          </a:p>
+          <a:p>
+            <a:r>
+              <a:rPr lang="en-US" sz="2400"/>
+              <a:t>Social media involves unique NER challenges due to irregular text</a:t>
             </a:r>
           </a:p>
         </p:txBody>
@@ -8801,7 +8774,7 @@
           <p:cNvPr id="9" name="Picture 8">
             <a:extLst>
               <a:ext uri="{FF2B5EF4-FFF2-40B4-BE49-F238E27FC236}">
-                <a16:creationId xmlns:a16="http://schemas.microsoft.com/office/drawing/2014/main" xmlns="" id="{E1DD3FFF-CBA4-4672-8CFC-76ADC6C35748}"/>
+                <a16:creationId xmlns="" xmlns:a16="http://schemas.microsoft.com/office/drawing/2014/main" id="{E1DD3FFF-CBA4-4672-8CFC-76ADC6C35748}"/>
               </a:ext>
             </a:extLst>
           </p:cNvPr>
@@ -8818,8 +8791,8 @@
         </p:blipFill>
         <p:spPr>
           <a:xfrm>
-            <a:off x="2395465" y="4489704"/>
-            <a:ext cx="5096431" cy="2179320"/>
+            <a:off x="1548378" y="3355169"/>
+            <a:ext cx="5529755" cy="2364617"/>
           </a:xfrm>
           <a:prstGeom prst="rect">
             <a:avLst/>
@@ -8831,7 +8804,7 @@
           <p:cNvPr id="11" name="TextBox 10">
             <a:extLst>
               <a:ext uri="{FF2B5EF4-FFF2-40B4-BE49-F238E27FC236}">
-                <a16:creationId xmlns:a16="http://schemas.microsoft.com/office/drawing/2014/main" xmlns="" id="{E85CB4B4-ABDB-482D-B80B-413EB31EB1B1}"/>
+                <a16:creationId xmlns="" xmlns:a16="http://schemas.microsoft.com/office/drawing/2014/main" id="{E85CB4B4-ABDB-482D-B80B-413EB31EB1B1}"/>
               </a:ext>
             </a:extLst>
           </p:cNvPr>
@@ -8841,7 +8814,7 @@
         <p:spPr>
           <a:xfrm>
             <a:off x="6475476" y="6484358"/>
-            <a:ext cx="2668524" cy="369332"/>
+            <a:ext cx="2668524" cy="307777"/>
           </a:xfrm>
           <a:prstGeom prst="rect">
             <a:avLst/>
@@ -8856,7 +8829,7 @@
           <a:p>
             <a:pPr algn="r"/>
             <a:r>
-              <a:rPr lang="en-US">
+              <a:rPr lang="en-US" sz="1400">
                 <a:solidFill>
                   <a:srgbClr val="002060"/>
                 </a:solidFill>
@@ -8908,7 +8881,7 @@
           <p:cNvPr id="2" name="Title 1">
             <a:extLst>
               <a:ext uri="{FF2B5EF4-FFF2-40B4-BE49-F238E27FC236}">
-                <a16:creationId xmlns:a16="http://schemas.microsoft.com/office/drawing/2014/main" xmlns="" id="{A686F44C-1A70-4DDC-B6C1-F78384CF90BF}"/>
+                <a16:creationId xmlns="" xmlns:a16="http://schemas.microsoft.com/office/drawing/2014/main" id="{A686F44C-1A70-4DDC-B6C1-F78384CF90BF}"/>
               </a:ext>
             </a:extLst>
           </p:cNvPr>
@@ -8926,7 +8899,7 @@
           <a:p>
             <a:r>
               <a:rPr lang="en-US"/>
-              <a:t>Relevance to Crisis Informatics</a:t>
+              <a:t>Motivation for NER</a:t>
             </a:r>
           </a:p>
         </p:txBody>
@@ -8936,7 +8909,7 @@
           <p:cNvPr id="3" name="Content Placeholder 2">
             <a:extLst>
               <a:ext uri="{FF2B5EF4-FFF2-40B4-BE49-F238E27FC236}">
-                <a16:creationId xmlns:a16="http://schemas.microsoft.com/office/drawing/2014/main" xmlns="" id="{0E3B6853-3F6F-4F58-A37E-45DAEC469477}"/>
+                <a16:creationId xmlns="" xmlns:a16="http://schemas.microsoft.com/office/drawing/2014/main" id="{0E3B6853-3F6F-4F58-A37E-45DAEC469477}"/>
               </a:ext>
             </a:extLst>
           </p:cNvPr>
@@ -8954,7 +8927,7 @@
           <a:p>
             <a:r>
               <a:rPr lang="en-US"/>
-              <a:t>Many named entities mentioned in tweets and other social media</a:t>
+              <a:t>Many named entities in tweets and social media</a:t>
             </a:r>
           </a:p>
           <a:p>
@@ -8968,7 +8941,7 @@
           <p:cNvPr id="5" name="Picture 4">
             <a:extLst>
               <a:ext uri="{FF2B5EF4-FFF2-40B4-BE49-F238E27FC236}">
-                <a16:creationId xmlns:a16="http://schemas.microsoft.com/office/drawing/2014/main" xmlns="" id="{F6A73548-AD6F-4936-98C2-4C8F902EFAF3}"/>
+                <a16:creationId xmlns="" xmlns:a16="http://schemas.microsoft.com/office/drawing/2014/main" id="{F6A73548-AD6F-4936-98C2-4C8F902EFAF3}"/>
               </a:ext>
             </a:extLst>
           </p:cNvPr>
@@ -8998,7 +8971,7 @@
           <p:cNvPr id="6" name="Picture 5">
             <a:extLst>
               <a:ext uri="{FF2B5EF4-FFF2-40B4-BE49-F238E27FC236}">
-                <a16:creationId xmlns:a16="http://schemas.microsoft.com/office/drawing/2014/main" xmlns="" id="{816EC7DE-502D-4D73-9E1E-0919F80BA181}"/>
+                <a16:creationId xmlns="" xmlns:a16="http://schemas.microsoft.com/office/drawing/2014/main" id="{816EC7DE-502D-4D73-9E1E-0919F80BA181}"/>
               </a:ext>
             </a:extLst>
           </p:cNvPr>
@@ -9028,7 +9001,7 @@
           <p:cNvPr id="7" name="Rectangle 6">
             <a:extLst>
               <a:ext uri="{FF2B5EF4-FFF2-40B4-BE49-F238E27FC236}">
-                <a16:creationId xmlns:a16="http://schemas.microsoft.com/office/drawing/2014/main" xmlns="" id="{D5E7CCDA-0121-422A-A1C4-E09689454311}"/>
+                <a16:creationId xmlns="" xmlns:a16="http://schemas.microsoft.com/office/drawing/2014/main" id="{D5E7CCDA-0121-422A-A1C4-E09689454311}"/>
               </a:ext>
             </a:extLst>
           </p:cNvPr>
@@ -9080,7 +9053,7 @@
           <p:cNvPr id="8" name="Rectangle 7">
             <a:extLst>
               <a:ext uri="{FF2B5EF4-FFF2-40B4-BE49-F238E27FC236}">
-                <a16:creationId xmlns:a16="http://schemas.microsoft.com/office/drawing/2014/main" xmlns="" id="{5A1D2F74-D1A6-4348-BEE6-51AADC969511}"/>
+                <a16:creationId xmlns="" xmlns:a16="http://schemas.microsoft.com/office/drawing/2014/main" id="{5A1D2F74-D1A6-4348-BEE6-51AADC969511}"/>
               </a:ext>
             </a:extLst>
           </p:cNvPr>
@@ -9132,7 +9105,7 @@
           <p:cNvPr id="9" name="Rectangle 8">
             <a:extLst>
               <a:ext uri="{FF2B5EF4-FFF2-40B4-BE49-F238E27FC236}">
-                <a16:creationId xmlns:a16="http://schemas.microsoft.com/office/drawing/2014/main" xmlns="" id="{F3E9BCA7-2E67-459E-BD66-6F6B6967B217}"/>
+                <a16:creationId xmlns="" xmlns:a16="http://schemas.microsoft.com/office/drawing/2014/main" id="{F3E9BCA7-2E67-459E-BD66-6F6B6967B217}"/>
               </a:ext>
             </a:extLst>
           </p:cNvPr>
@@ -9184,7 +9157,7 @@
           <p:cNvPr id="10" name="Rectangle 9">
             <a:extLst>
               <a:ext uri="{FF2B5EF4-FFF2-40B4-BE49-F238E27FC236}">
-                <a16:creationId xmlns:a16="http://schemas.microsoft.com/office/drawing/2014/main" xmlns="" id="{D5A862B6-C16B-47F8-9F98-8F8A4A4AD4AC}"/>
+                <a16:creationId xmlns="" xmlns:a16="http://schemas.microsoft.com/office/drawing/2014/main" id="{D5A862B6-C16B-47F8-9F98-8F8A4A4AD4AC}"/>
               </a:ext>
             </a:extLst>
           </p:cNvPr>
@@ -9236,7 +9209,7 @@
           <p:cNvPr id="11" name="Rectangle 10">
             <a:extLst>
               <a:ext uri="{FF2B5EF4-FFF2-40B4-BE49-F238E27FC236}">
-                <a16:creationId xmlns:a16="http://schemas.microsoft.com/office/drawing/2014/main" xmlns="" id="{FE63E471-40E4-41B6-978E-01DC7E7378BD}"/>
+                <a16:creationId xmlns="" xmlns:a16="http://schemas.microsoft.com/office/drawing/2014/main" id="{FE63E471-40E4-41B6-978E-01DC7E7378BD}"/>
               </a:ext>
             </a:extLst>
           </p:cNvPr>
@@ -9288,7 +9261,7 @@
           <p:cNvPr id="12" name="Rectangle 11">
             <a:extLst>
               <a:ext uri="{FF2B5EF4-FFF2-40B4-BE49-F238E27FC236}">
-                <a16:creationId xmlns:a16="http://schemas.microsoft.com/office/drawing/2014/main" xmlns="" id="{2D17F17B-A4FB-4D72-A311-593B770633CD}"/>
+                <a16:creationId xmlns="" xmlns:a16="http://schemas.microsoft.com/office/drawing/2014/main" id="{2D17F17B-A4FB-4D72-A311-593B770633CD}"/>
               </a:ext>
             </a:extLst>
           </p:cNvPr>
@@ -9340,7 +9313,7 @@
           <p:cNvPr id="13" name="Rectangle 12">
             <a:extLst>
               <a:ext uri="{FF2B5EF4-FFF2-40B4-BE49-F238E27FC236}">
-                <a16:creationId xmlns:a16="http://schemas.microsoft.com/office/drawing/2014/main" xmlns="" id="{124121EA-6AD7-4BA9-8A91-CD68E3806E19}"/>
+                <a16:creationId xmlns="" xmlns:a16="http://schemas.microsoft.com/office/drawing/2014/main" id="{124121EA-6AD7-4BA9-8A91-CD68E3806E19}"/>
               </a:ext>
             </a:extLst>
           </p:cNvPr>
@@ -9392,7 +9365,7 @@
           <p:cNvPr id="14" name="Rectangle 13">
             <a:extLst>
               <a:ext uri="{FF2B5EF4-FFF2-40B4-BE49-F238E27FC236}">
-                <a16:creationId xmlns:a16="http://schemas.microsoft.com/office/drawing/2014/main" xmlns="" id="{47862579-EB7B-4D1D-BA56-6F323EDBA8AC}"/>
+                <a16:creationId xmlns="" xmlns:a16="http://schemas.microsoft.com/office/drawing/2014/main" id="{47862579-EB7B-4D1D-BA56-6F323EDBA8AC}"/>
               </a:ext>
             </a:extLst>
           </p:cNvPr>
@@ -9444,7 +9417,7 @@
           <p:cNvPr id="15" name="Rectangle 14">
             <a:extLst>
               <a:ext uri="{FF2B5EF4-FFF2-40B4-BE49-F238E27FC236}">
-                <a16:creationId xmlns:a16="http://schemas.microsoft.com/office/drawing/2014/main" xmlns="" id="{22BFF930-DFB6-4A85-A24D-4531F112F1E0}"/>
+                <a16:creationId xmlns="" xmlns:a16="http://schemas.microsoft.com/office/drawing/2014/main" id="{22BFF930-DFB6-4A85-A24D-4531F112F1E0}"/>
               </a:ext>
             </a:extLst>
           </p:cNvPr>
@@ -9496,7 +9469,7 @@
           <p:cNvPr id="16" name="Rectangle 15">
             <a:extLst>
               <a:ext uri="{FF2B5EF4-FFF2-40B4-BE49-F238E27FC236}">
-                <a16:creationId xmlns:a16="http://schemas.microsoft.com/office/drawing/2014/main" xmlns="" id="{B91AD430-A92C-40AB-8EF1-E27C29877604}"/>
+                <a16:creationId xmlns="" xmlns:a16="http://schemas.microsoft.com/office/drawing/2014/main" id="{B91AD430-A92C-40AB-8EF1-E27C29877604}"/>
               </a:ext>
             </a:extLst>
           </p:cNvPr>
@@ -9548,7 +9521,7 @@
           <p:cNvPr id="17" name="Rectangle 16">
             <a:extLst>
               <a:ext uri="{FF2B5EF4-FFF2-40B4-BE49-F238E27FC236}">
-                <a16:creationId xmlns:a16="http://schemas.microsoft.com/office/drawing/2014/main" xmlns="" id="{830C085B-1FAB-49A8-9D06-919097FB53D1}"/>
+                <a16:creationId xmlns="" xmlns:a16="http://schemas.microsoft.com/office/drawing/2014/main" id="{830C085B-1FAB-49A8-9D06-919097FB53D1}"/>
               </a:ext>
             </a:extLst>
           </p:cNvPr>
@@ -9637,7 +9610,7 @@
           <p:cNvPr id="2" name="Title 1">
             <a:extLst>
               <a:ext uri="{FF2B5EF4-FFF2-40B4-BE49-F238E27FC236}">
-                <a16:creationId xmlns:a16="http://schemas.microsoft.com/office/drawing/2014/main" xmlns="" id="{A686F44C-1A70-4DDC-B6C1-F78384CF90BF}"/>
+                <a16:creationId xmlns="" xmlns:a16="http://schemas.microsoft.com/office/drawing/2014/main" id="{A686F44C-1A70-4DDC-B6C1-F78384CF90BF}"/>
               </a:ext>
             </a:extLst>
           </p:cNvPr>
@@ -9655,7 +9628,7 @@
           <a:p>
             <a:r>
               <a:rPr lang="en-US"/>
-              <a:t>Relevance to Crisis Informatics</a:t>
+              <a:t>Motivation for NER</a:t>
             </a:r>
           </a:p>
         </p:txBody>
@@ -9665,7 +9638,7 @@
           <p:cNvPr id="3" name="Content Placeholder 2">
             <a:extLst>
               <a:ext uri="{FF2B5EF4-FFF2-40B4-BE49-F238E27FC236}">
-                <a16:creationId xmlns:a16="http://schemas.microsoft.com/office/drawing/2014/main" xmlns="" id="{0E3B6853-3F6F-4F58-A37E-45DAEC469477}"/>
+                <a16:creationId xmlns="" xmlns:a16="http://schemas.microsoft.com/office/drawing/2014/main" id="{0E3B6853-3F6F-4F58-A37E-45DAEC469477}"/>
               </a:ext>
             </a:extLst>
           </p:cNvPr>
@@ -9696,62 +9669,14 @@
             <a:pPr lvl="1"/>
             <a:r>
               <a:rPr lang="en-US"/>
-              <a:t>What </a:t>
-            </a:r>
-            <a:r>
-              <a:rPr lang="en-US">
-                <a:solidFill>
-                  <a:srgbClr val="FF0000"/>
-                </a:solidFill>
-              </a:rPr>
-              <a:t>locations</a:t>
-            </a:r>
+              <a:t>What locations have received ‘Storm Surge Warnings’ from the NHC in the last 10 days?</a:t>
+            </a:r>
+          </a:p>
+          <a:p>
+            <a:pPr lvl="1"/>
             <a:r>
               <a:rPr lang="en-US"/>
-              <a:t> have received ‘Storm Surge Warnings’ from the </a:t>
-            </a:r>
-            <a:r>
-              <a:rPr lang="en-US">
-                <a:solidFill>
-                  <a:srgbClr val="FF0000"/>
-                </a:solidFill>
-              </a:rPr>
-              <a:t>NHC</a:t>
-            </a:r>
-            <a:r>
-              <a:rPr lang="en-US"/>
-              <a:t> in the last 10 days?</a:t>
-            </a:r>
-          </a:p>
-          <a:p>
-            <a:pPr lvl="1"/>
-            <a:r>
-              <a:rPr lang="en-US"/>
-              <a:t>What </a:t>
-            </a:r>
-            <a:r>
-              <a:rPr lang="en-US">
-                <a:solidFill>
-                  <a:srgbClr val="FF0000"/>
-                </a:solidFill>
-              </a:rPr>
-              <a:t>organizations</a:t>
-            </a:r>
-            <a:r>
-              <a:rPr lang="en-US"/>
-              <a:t> were involved in relief efforts for </a:t>
-            </a:r>
-            <a:r>
-              <a:rPr lang="en-US">
-                <a:solidFill>
-                  <a:srgbClr val="FF0000"/>
-                </a:solidFill>
-              </a:rPr>
-              <a:t>Hurricane Irma</a:t>
-            </a:r>
-            <a:r>
-              <a:rPr lang="en-US"/>
-              <a:t>?</a:t>
+              <a:t>What organizations were involved in relief efforts for Hurricane Irma?</a:t>
             </a:r>
           </a:p>
           <a:p>
@@ -9802,7 +9727,7 @@
           <p:cNvPr id="2" name="Title 1">
             <a:extLst>
               <a:ext uri="{FF2B5EF4-FFF2-40B4-BE49-F238E27FC236}">
-                <a16:creationId xmlns:a16="http://schemas.microsoft.com/office/drawing/2014/main" xmlns="" id="{A686F44C-1A70-4DDC-B6C1-F78384CF90BF}"/>
+                <a16:creationId xmlns="" xmlns:a16="http://schemas.microsoft.com/office/drawing/2014/main" id="{A686F44C-1A70-4DDC-B6C1-F78384CF90BF}"/>
               </a:ext>
             </a:extLst>
           </p:cNvPr>
@@ -9820,8 +9745,9 @@
           <a:p>
             <a:r>
               <a:rPr lang="en-US"/>
-              <a:t>Relevance to Crisis Informatics</a:t>
-            </a:r>
+              <a:t>Motivation for NER</a:t>
+            </a:r>
+            <a:endParaRPr lang="en-US"/>
           </a:p>
         </p:txBody>
       </p:sp>
@@ -9830,7 +9756,7 @@
           <p:cNvPr id="3" name="Content Placeholder 2">
             <a:extLst>
               <a:ext uri="{FF2B5EF4-FFF2-40B4-BE49-F238E27FC236}">
-                <a16:creationId xmlns:a16="http://schemas.microsoft.com/office/drawing/2014/main" xmlns="" id="{0E3B6853-3F6F-4F58-A37E-45DAEC469477}"/>
+                <a16:creationId xmlns="" xmlns:a16="http://schemas.microsoft.com/office/drawing/2014/main" id="{0E3B6853-3F6F-4F58-A37E-45DAEC469477}"/>
               </a:ext>
             </a:extLst>
           </p:cNvPr>
@@ -9882,7 +9808,7 @@
           <p:cNvPr id="4" name="Picture 3">
             <a:extLst>
               <a:ext uri="{FF2B5EF4-FFF2-40B4-BE49-F238E27FC236}">
-                <a16:creationId xmlns:a16="http://schemas.microsoft.com/office/drawing/2014/main" xmlns="" id="{D8CFBEAF-7F86-415F-A421-630C06315EF5}"/>
+                <a16:creationId xmlns="" xmlns:a16="http://schemas.microsoft.com/office/drawing/2014/main" id="{D8CFBEAF-7F86-415F-A421-630C06315EF5}"/>
               </a:ext>
             </a:extLst>
           </p:cNvPr>
@@ -9912,7 +9838,7 @@
           <p:cNvPr id="5" name="Rectangle 4">
             <a:extLst>
               <a:ext uri="{FF2B5EF4-FFF2-40B4-BE49-F238E27FC236}">
-                <a16:creationId xmlns:a16="http://schemas.microsoft.com/office/drawing/2014/main" xmlns="" id="{3A3D486C-EB90-481F-A0F5-6971C9707494}"/>
+                <a16:creationId xmlns="" xmlns:a16="http://schemas.microsoft.com/office/drawing/2014/main" id="{3A3D486C-EB90-481F-A0F5-6971C9707494}"/>
               </a:ext>
             </a:extLst>
           </p:cNvPr>
@@ -9964,7 +9890,7 @@
           <p:cNvPr id="7" name="Straight Arrow Connector 6">
             <a:extLst>
               <a:ext uri="{FF2B5EF4-FFF2-40B4-BE49-F238E27FC236}">
-                <a16:creationId xmlns:a16="http://schemas.microsoft.com/office/drawing/2014/main" xmlns="" id="{6B5C1F01-6FC6-41B6-986B-614A7417DC21}"/>
+                <a16:creationId xmlns="" xmlns:a16="http://schemas.microsoft.com/office/drawing/2014/main" id="{6B5C1F01-6FC6-41B6-986B-614A7417DC21}"/>
               </a:ext>
             </a:extLst>
           </p:cNvPr>
@@ -10061,7 +9987,7 @@
           <a:p>
             <a:r>
               <a:rPr lang="en-US"/>
-              <a:t>Typical NER Approach</a:t>
+              <a:t>Classic NER Approach</a:t>
             </a:r>
             <a:endParaRPr lang="en-US" dirty="0"/>
           </a:p>
@@ -10072,7 +9998,7 @@
           <p:cNvPr id="7" name="Content Placeholder 6">
             <a:extLst>
               <a:ext uri="{FF2B5EF4-FFF2-40B4-BE49-F238E27FC236}">
-                <a16:creationId xmlns:a16="http://schemas.microsoft.com/office/drawing/2014/main" xmlns="" id="{13D3C029-F9AA-4E5C-8627-46A9ED1284E6}"/>
+                <a16:creationId xmlns="" xmlns:a16="http://schemas.microsoft.com/office/drawing/2014/main" id="{13D3C029-F9AA-4E5C-8627-46A9ED1284E6}"/>
               </a:ext>
             </a:extLst>
           </p:cNvPr>
@@ -10095,7 +10021,7 @@
           <a:p>
             <a:r>
               <a:rPr lang="en-US"/>
-              <a:t>Till recently, most models framed the problem as ‘sequence labeling’ using techniques like Conditional Random Fields and (earlier) Hidden Markov Models</a:t>
+              <a:t>Till recently, most models framed the problem as ‘sequence labeling’ using techniques like Conditional Random Fields or (earlier) Hidden Markov Models</a:t>
             </a:r>
           </a:p>
         </p:txBody>
@@ -10105,7 +10031,7 @@
           <p:cNvPr id="1026" name="Picture 2" descr="Related image">
             <a:extLst>
               <a:ext uri="{FF2B5EF4-FFF2-40B4-BE49-F238E27FC236}">
-                <a16:creationId xmlns:a16="http://schemas.microsoft.com/office/drawing/2014/main" xmlns="" id="{10228010-65D9-4664-9A19-50D2A115129D}"/>
+                <a16:creationId xmlns="" xmlns:a16="http://schemas.microsoft.com/office/drawing/2014/main" id="{10228010-65D9-4664-9A19-50D2A115129D}"/>
               </a:ext>
             </a:extLst>
           </p:cNvPr>
@@ -10152,7 +10078,7 @@
           <p:cNvPr id="14" name="TextBox 13">
             <a:extLst>
               <a:ext uri="{FF2B5EF4-FFF2-40B4-BE49-F238E27FC236}">
-                <a16:creationId xmlns:a16="http://schemas.microsoft.com/office/drawing/2014/main" xmlns="" id="{6DFB3C83-0C7A-4535-96AA-E84D929A4E6A}"/>
+                <a16:creationId xmlns="" xmlns:a16="http://schemas.microsoft.com/office/drawing/2014/main" id="{6DFB3C83-0C7A-4535-96AA-E84D929A4E6A}"/>
               </a:ext>
             </a:extLst>
           </p:cNvPr>
@@ -10229,7 +10155,7 @@
           <p:cNvPr id="2" name="Title 1">
             <a:extLst>
               <a:ext uri="{FF2B5EF4-FFF2-40B4-BE49-F238E27FC236}">
-                <a16:creationId xmlns:a16="http://schemas.microsoft.com/office/drawing/2014/main" xmlns="" id="{5F44972C-1277-45AF-857F-5C44DCAA94E2}"/>
+                <a16:creationId xmlns="" xmlns:a16="http://schemas.microsoft.com/office/drawing/2014/main" id="{5F44972C-1277-45AF-857F-5C44DCAA94E2}"/>
               </a:ext>
             </a:extLst>
           </p:cNvPr>
@@ -10257,7 +10183,7 @@
           <p:cNvPr id="3" name="Content Placeholder 2">
             <a:extLst>
               <a:ext uri="{FF2B5EF4-FFF2-40B4-BE49-F238E27FC236}">
-                <a16:creationId xmlns:a16="http://schemas.microsoft.com/office/drawing/2014/main" xmlns="" id="{AD4D6E95-FB39-4A81-BE0C-47FCB77127E2}"/>
+                <a16:creationId xmlns="" xmlns:a16="http://schemas.microsoft.com/office/drawing/2014/main" id="{AD4D6E95-FB39-4A81-BE0C-47FCB77127E2}"/>
               </a:ext>
             </a:extLst>
           </p:cNvPr>
@@ -10286,19 +10212,7 @@
           <a:p>
             <a:r>
               <a:rPr lang="en-US"/>
-              <a:t>Recently, word embeddings (and more complex </a:t>
-            </a:r>
-            <a:r>
-              <a:rPr lang="en-US">
-                <a:solidFill>
-                  <a:srgbClr val="FF0000"/>
-                </a:solidFill>
-              </a:rPr>
-              <a:t>sense-awar</a:t>
-            </a:r>
-            <a:r>
-              <a:rPr lang="en-US"/>
-              <a:t>e variants) have been used to address the problem</a:t>
+              <a:t>Recently, word embeddings (and more complex sense-aware variants) have been used to address the problem</a:t>
             </a:r>
           </a:p>
         </p:txBody>
@@ -10308,7 +10222,7 @@
           <p:cNvPr id="5" name="Picture 4">
             <a:extLst>
               <a:ext uri="{FF2B5EF4-FFF2-40B4-BE49-F238E27FC236}">
-                <a16:creationId xmlns:a16="http://schemas.microsoft.com/office/drawing/2014/main" xmlns="" id="{E31F759C-413A-4273-876B-1CA3A9286686}"/>
+                <a16:creationId xmlns="" xmlns:a16="http://schemas.microsoft.com/office/drawing/2014/main" id="{E31F759C-413A-4273-876B-1CA3A9286686}"/>
               </a:ext>
             </a:extLst>
           </p:cNvPr>
@@ -10338,7 +10252,7 @@
           <p:cNvPr id="7" name="Straight Arrow Connector 6">
             <a:extLst>
               <a:ext uri="{FF2B5EF4-FFF2-40B4-BE49-F238E27FC236}">
-                <a16:creationId xmlns:a16="http://schemas.microsoft.com/office/drawing/2014/main" xmlns="" id="{482D490B-F863-49BB-82B1-21ED41AC47F8}"/>
+                <a16:creationId xmlns="" xmlns:a16="http://schemas.microsoft.com/office/drawing/2014/main" id="{482D490B-F863-49BB-82B1-21ED41AC47F8}"/>
               </a:ext>
             </a:extLst>
           </p:cNvPr>
@@ -10379,7 +10293,7 @@
           <p:cNvPr id="9" name="Straight Arrow Connector 8">
             <a:extLst>
               <a:ext uri="{FF2B5EF4-FFF2-40B4-BE49-F238E27FC236}">
-                <a16:creationId xmlns:a16="http://schemas.microsoft.com/office/drawing/2014/main" xmlns="" id="{188D38CF-57BF-4AE7-A5CD-D7AB3F163338}"/>
+                <a16:creationId xmlns="" xmlns:a16="http://schemas.microsoft.com/office/drawing/2014/main" id="{188D38CF-57BF-4AE7-A5CD-D7AB3F163338}"/>
               </a:ext>
             </a:extLst>
           </p:cNvPr>
@@ -10420,7 +10334,7 @@
           <p:cNvPr id="19" name="Picture 18">
             <a:extLst>
               <a:ext uri="{FF2B5EF4-FFF2-40B4-BE49-F238E27FC236}">
-                <a16:creationId xmlns:a16="http://schemas.microsoft.com/office/drawing/2014/main" xmlns="" id="{0D7BFADC-AEDA-4227-BD9E-21855850E785}"/>
+                <a16:creationId xmlns="" xmlns:a16="http://schemas.microsoft.com/office/drawing/2014/main" id="{0D7BFADC-AEDA-4227-BD9E-21855850E785}"/>
               </a:ext>
             </a:extLst>
           </p:cNvPr>
@@ -10450,7 +10364,7 @@
           <p:cNvPr id="18" name="Picture 17">
             <a:extLst>
               <a:ext uri="{FF2B5EF4-FFF2-40B4-BE49-F238E27FC236}">
-                <a16:creationId xmlns:a16="http://schemas.microsoft.com/office/drawing/2014/main" xmlns="" id="{F17571D6-AE91-4354-BED2-D90B6DFEE185}"/>
+                <a16:creationId xmlns="" xmlns:a16="http://schemas.microsoft.com/office/drawing/2014/main" id="{F17571D6-AE91-4354-BED2-D90B6DFEE185}"/>
               </a:ext>
             </a:extLst>
           </p:cNvPr>
@@ -10480,7 +10394,7 @@
           <p:cNvPr id="20" name="Picture 19">
             <a:extLst>
               <a:ext uri="{FF2B5EF4-FFF2-40B4-BE49-F238E27FC236}">
-                <a16:creationId xmlns:a16="http://schemas.microsoft.com/office/drawing/2014/main" xmlns="" id="{6CFE4D04-D2D0-40F7-BA00-7F0C0CCD624D}"/>
+                <a16:creationId xmlns="" xmlns:a16="http://schemas.microsoft.com/office/drawing/2014/main" id="{6CFE4D04-D2D0-40F7-BA00-7F0C0CCD624D}"/>
               </a:ext>
             </a:extLst>
           </p:cNvPr>
@@ -10510,7 +10424,7 @@
           <p:cNvPr id="21" name="Picture 20">
             <a:extLst>
               <a:ext uri="{FF2B5EF4-FFF2-40B4-BE49-F238E27FC236}">
-                <a16:creationId xmlns:a16="http://schemas.microsoft.com/office/drawing/2014/main" xmlns="" id="{189FF996-CE2C-4DDA-95B7-85B9DFD7CBED}"/>
+                <a16:creationId xmlns="" xmlns:a16="http://schemas.microsoft.com/office/drawing/2014/main" id="{189FF996-CE2C-4DDA-95B7-85B9DFD7CBED}"/>
               </a:ext>
             </a:extLst>
           </p:cNvPr>
@@ -10794,7 +10708,7 @@
           <p:cNvPr id="2" name="Title 1">
             <a:extLst>
               <a:ext uri="{FF2B5EF4-FFF2-40B4-BE49-F238E27FC236}">
-                <a16:creationId xmlns:a16="http://schemas.microsoft.com/office/drawing/2014/main" xmlns="" id="{5F44972C-1277-45AF-857F-5C44DCAA94E2}"/>
+                <a16:creationId xmlns="" xmlns:a16="http://schemas.microsoft.com/office/drawing/2014/main" id="{5F44972C-1277-45AF-857F-5C44DCAA94E2}"/>
               </a:ext>
             </a:extLst>
           </p:cNvPr>
@@ -10822,7 +10736,7 @@
           <p:cNvPr id="3" name="Content Placeholder 2">
             <a:extLst>
               <a:ext uri="{FF2B5EF4-FFF2-40B4-BE49-F238E27FC236}">
-                <a16:creationId xmlns:a16="http://schemas.microsoft.com/office/drawing/2014/main" xmlns="" id="{AD4D6E95-FB39-4A81-BE0C-47FCB77127E2}"/>
+                <a16:creationId xmlns="" xmlns:a16="http://schemas.microsoft.com/office/drawing/2014/main" id="{AD4D6E95-FB39-4A81-BE0C-47FCB77127E2}"/>
               </a:ext>
             </a:extLst>
           </p:cNvPr>
@@ -10873,7 +10787,7 @@
           <p:cNvPr id="5" name="Picture 4">
             <a:extLst>
               <a:ext uri="{FF2B5EF4-FFF2-40B4-BE49-F238E27FC236}">
-                <a16:creationId xmlns:a16="http://schemas.microsoft.com/office/drawing/2014/main" xmlns="" id="{E31F759C-413A-4273-876B-1CA3A9286686}"/>
+                <a16:creationId xmlns="" xmlns:a16="http://schemas.microsoft.com/office/drawing/2014/main" id="{E31F759C-413A-4273-876B-1CA3A9286686}"/>
               </a:ext>
             </a:extLst>
           </p:cNvPr>
@@ -10903,7 +10817,7 @@
           <p:cNvPr id="7" name="Straight Arrow Connector 6">
             <a:extLst>
               <a:ext uri="{FF2B5EF4-FFF2-40B4-BE49-F238E27FC236}">
-                <a16:creationId xmlns:a16="http://schemas.microsoft.com/office/drawing/2014/main" xmlns="" id="{482D490B-F863-49BB-82B1-21ED41AC47F8}"/>
+                <a16:creationId xmlns="" xmlns:a16="http://schemas.microsoft.com/office/drawing/2014/main" id="{482D490B-F863-49BB-82B1-21ED41AC47F8}"/>
               </a:ext>
             </a:extLst>
           </p:cNvPr>
@@ -10944,7 +10858,7 @@
           <p:cNvPr id="9" name="Straight Arrow Connector 8">
             <a:extLst>
               <a:ext uri="{FF2B5EF4-FFF2-40B4-BE49-F238E27FC236}">
-                <a16:creationId xmlns:a16="http://schemas.microsoft.com/office/drawing/2014/main" xmlns="" id="{188D38CF-57BF-4AE7-A5CD-D7AB3F163338}"/>
+                <a16:creationId xmlns="" xmlns:a16="http://schemas.microsoft.com/office/drawing/2014/main" id="{188D38CF-57BF-4AE7-A5CD-D7AB3F163338}"/>
               </a:ext>
             </a:extLst>
           </p:cNvPr>
@@ -10985,7 +10899,7 @@
           <p:cNvPr id="19" name="Picture 18">
             <a:extLst>
               <a:ext uri="{FF2B5EF4-FFF2-40B4-BE49-F238E27FC236}">
-                <a16:creationId xmlns:a16="http://schemas.microsoft.com/office/drawing/2014/main" xmlns="" id="{0D7BFADC-AEDA-4227-BD9E-21855850E785}"/>
+                <a16:creationId xmlns="" xmlns:a16="http://schemas.microsoft.com/office/drawing/2014/main" id="{0D7BFADC-AEDA-4227-BD9E-21855850E785}"/>
               </a:ext>
             </a:extLst>
           </p:cNvPr>
@@ -11015,7 +10929,7 @@
           <p:cNvPr id="18" name="Picture 17">
             <a:extLst>
               <a:ext uri="{FF2B5EF4-FFF2-40B4-BE49-F238E27FC236}">
-                <a16:creationId xmlns:a16="http://schemas.microsoft.com/office/drawing/2014/main" xmlns="" id="{F17571D6-AE91-4354-BED2-D90B6DFEE185}"/>
+                <a16:creationId xmlns="" xmlns:a16="http://schemas.microsoft.com/office/drawing/2014/main" id="{F17571D6-AE91-4354-BED2-D90B6DFEE185}"/>
               </a:ext>
             </a:extLst>
           </p:cNvPr>
@@ -11045,7 +10959,7 @@
           <p:cNvPr id="20" name="Picture 19">
             <a:extLst>
               <a:ext uri="{FF2B5EF4-FFF2-40B4-BE49-F238E27FC236}">
-                <a16:creationId xmlns:a16="http://schemas.microsoft.com/office/drawing/2014/main" xmlns="" id="{6CFE4D04-D2D0-40F7-BA00-7F0C0CCD624D}"/>
+                <a16:creationId xmlns="" xmlns:a16="http://schemas.microsoft.com/office/drawing/2014/main" id="{6CFE4D04-D2D0-40F7-BA00-7F0C0CCD624D}"/>
               </a:ext>
             </a:extLst>
           </p:cNvPr>
@@ -11075,7 +10989,7 @@
           <p:cNvPr id="21" name="Picture 20">
             <a:extLst>
               <a:ext uri="{FF2B5EF4-FFF2-40B4-BE49-F238E27FC236}">
-                <a16:creationId xmlns:a16="http://schemas.microsoft.com/office/drawing/2014/main" xmlns="" id="{189FF996-CE2C-4DDA-95B7-85B9DFD7CBED}"/>
+                <a16:creationId xmlns="" xmlns:a16="http://schemas.microsoft.com/office/drawing/2014/main" id="{189FF996-CE2C-4DDA-95B7-85B9DFD7CBED}"/>
               </a:ext>
             </a:extLst>
           </p:cNvPr>
@@ -11105,7 +11019,7 @@
           <p:cNvPr id="11" name="Rectangle 10">
             <a:extLst>
               <a:ext uri="{FF2B5EF4-FFF2-40B4-BE49-F238E27FC236}">
-                <a16:creationId xmlns:a16="http://schemas.microsoft.com/office/drawing/2014/main" xmlns="" id="{30DBC704-3387-4A5D-A8E1-6CA6EEB5ADF6}"/>
+                <a16:creationId xmlns="" xmlns:a16="http://schemas.microsoft.com/office/drawing/2014/main" id="{30DBC704-3387-4A5D-A8E1-6CA6EEB5ADF6}"/>
               </a:ext>
             </a:extLst>
           </p:cNvPr>
@@ -11161,7 +11075,7 @@
           <p:cNvPr id="12" name="Title 1">
             <a:extLst>
               <a:ext uri="{FF2B5EF4-FFF2-40B4-BE49-F238E27FC236}">
-                <a16:creationId xmlns:a16="http://schemas.microsoft.com/office/drawing/2014/main" xmlns="" id="{95A38355-5A7F-4B61-8049-EB7D4C4B3DC5}"/>
+                <a16:creationId xmlns="" xmlns:a16="http://schemas.microsoft.com/office/drawing/2014/main" id="{95A38355-5A7F-4B61-8049-EB7D4C4B3DC5}"/>
               </a:ext>
             </a:extLst>
           </p:cNvPr>
@@ -11172,8 +11086,8 @@
         </p:nvSpPr>
         <p:spPr>
           <a:xfrm>
-            <a:off x="1914144" y="3281046"/>
-            <a:ext cx="5669280" cy="2387600"/>
+            <a:off x="1154811" y="2640948"/>
+            <a:ext cx="6601206" cy="2387600"/>
           </a:xfrm>
           <a:prstGeom prst="rect">
             <a:avLst/>
@@ -11181,7 +11095,7 @@
         </p:spPr>
         <p:txBody>
           <a:bodyPr vert="horz" lIns="91440" tIns="45720" rIns="91440" bIns="45720" rtlCol="0" anchor="ctr">
-            <a:normAutofit lnSpcReduction="10000"/>
+            <a:normAutofit/>
           </a:bodyPr>
           <a:lstStyle>
             <a:lvl1pPr algn="l" defTabSz="914400" rtl="0" eaLnBrk="1" latinLnBrk="0" hangingPunct="1">
@@ -11203,13 +11117,14 @@
             </a:lvl1pPr>
           </a:lstStyle>
           <a:p>
+            <a:pPr algn="ctr"/>
             <a:r>
               <a:rPr lang="en-US" b="1">
                 <a:solidFill>
                   <a:srgbClr val="002060"/>
                 </a:solidFill>
               </a:rPr>
-              <a:t>Demonstration of fastText (bag-of-tricks) word embeddings over Twitter data</a:t>
+              <a:t>Demonstration of fastText over Twitter data</a:t>
             </a:r>
             <a:endParaRPr lang="en-US" b="1" dirty="0">
               <a:solidFill>
@@ -11261,7 +11176,7 @@
           <p:cNvPr id="2" name="Title 1">
             <a:extLst>
               <a:ext uri="{FF2B5EF4-FFF2-40B4-BE49-F238E27FC236}">
-                <a16:creationId xmlns:a16="http://schemas.microsoft.com/office/drawing/2014/main" xmlns="" id="{FECCCB1F-69D0-45C7-9A40-FAC731823900}"/>
+                <a16:creationId xmlns="" xmlns:a16="http://schemas.microsoft.com/office/drawing/2014/main" id="{FECCCB1F-69D0-45C7-9A40-FAC731823900}"/>
               </a:ext>
             </a:extLst>
           </p:cNvPr>
@@ -11284,7 +11199,7 @@
           <a:p>
             <a:r>
               <a:rPr lang="en-US"/>
-              <a:t>Powerful Tools and Packages Available</a:t>
+              <a:t>Powerful Tools Available</a:t>
             </a:r>
           </a:p>
         </p:txBody>
@@ -11294,7 +11209,7 @@
           <p:cNvPr id="2050" name="Picture 2" descr="Image result for spacy ner">
             <a:extLst>
               <a:ext uri="{FF2B5EF4-FFF2-40B4-BE49-F238E27FC236}">
-                <a16:creationId xmlns:a16="http://schemas.microsoft.com/office/drawing/2014/main" xmlns="" id="{BF8CE563-B98B-4D8B-85DB-9319C6BB3BD6}"/>
+                <a16:creationId xmlns="" xmlns:a16="http://schemas.microsoft.com/office/drawing/2014/main" id="{BF8CE563-B98B-4D8B-85DB-9319C6BB3BD6}"/>
               </a:ext>
             </a:extLst>
           </p:cNvPr>
@@ -11341,7 +11256,7 @@
           <p:cNvPr id="7" name="Picture 6">
             <a:extLst>
               <a:ext uri="{FF2B5EF4-FFF2-40B4-BE49-F238E27FC236}">
-                <a16:creationId xmlns:a16="http://schemas.microsoft.com/office/drawing/2014/main" xmlns="" id="{C9D1664F-3E2D-44D1-869B-2D54C62EACC8}"/>
+                <a16:creationId xmlns="" xmlns:a16="http://schemas.microsoft.com/office/drawing/2014/main" id="{C9D1664F-3E2D-44D1-869B-2D54C62EACC8}"/>
               </a:ext>
             </a:extLst>
           </p:cNvPr>
@@ -11371,7 +11286,7 @@
           <p:cNvPr id="8" name="Picture 7">
             <a:extLst>
               <a:ext uri="{FF2B5EF4-FFF2-40B4-BE49-F238E27FC236}">
-                <a16:creationId xmlns:a16="http://schemas.microsoft.com/office/drawing/2014/main" xmlns="" id="{7DEDEEDD-DFDA-43E7-BDEF-132D6284F67E}"/>
+                <a16:creationId xmlns="" xmlns:a16="http://schemas.microsoft.com/office/drawing/2014/main" id="{7DEDEEDD-DFDA-43E7-BDEF-132D6284F67E}"/>
               </a:ext>
             </a:extLst>
           </p:cNvPr>
@@ -11401,7 +11316,7 @@
           <p:cNvPr id="9" name="Picture 8">
             <a:extLst>
               <a:ext uri="{FF2B5EF4-FFF2-40B4-BE49-F238E27FC236}">
-                <a16:creationId xmlns:a16="http://schemas.microsoft.com/office/drawing/2014/main" xmlns="" id="{5BF4D1C3-2098-4FA9-9AE9-B6310FFD0382}"/>
+                <a16:creationId xmlns="" xmlns:a16="http://schemas.microsoft.com/office/drawing/2014/main" id="{5BF4D1C3-2098-4FA9-9AE9-B6310FFD0382}"/>
               </a:ext>
             </a:extLst>
           </p:cNvPr>
@@ -11431,7 +11346,7 @@
           <p:cNvPr id="10" name="Picture 9">
             <a:extLst>
               <a:ext uri="{FF2B5EF4-FFF2-40B4-BE49-F238E27FC236}">
-                <a16:creationId xmlns:a16="http://schemas.microsoft.com/office/drawing/2014/main" xmlns="" id="{F6D94560-CDCC-433E-9834-5916B450239B}"/>
+                <a16:creationId xmlns="" xmlns:a16="http://schemas.microsoft.com/office/drawing/2014/main" id="{F6D94560-CDCC-433E-9834-5916B450239B}"/>
               </a:ext>
             </a:extLst>
           </p:cNvPr>
@@ -11461,7 +11376,7 @@
           <p:cNvPr id="11" name="Picture 10">
             <a:extLst>
               <a:ext uri="{FF2B5EF4-FFF2-40B4-BE49-F238E27FC236}">
-                <a16:creationId xmlns:a16="http://schemas.microsoft.com/office/drawing/2014/main" xmlns="" id="{CBF3A1EB-BA6B-484A-AA20-176F12D326FF}"/>
+                <a16:creationId xmlns="" xmlns:a16="http://schemas.microsoft.com/office/drawing/2014/main" id="{CBF3A1EB-BA6B-484A-AA20-176F12D326FF}"/>
               </a:ext>
             </a:extLst>
           </p:cNvPr>
@@ -11528,7 +11443,7 @@
           <p:cNvPr id="2" name="Title 1">
             <a:extLst>
               <a:ext uri="{FF2B5EF4-FFF2-40B4-BE49-F238E27FC236}">
-                <a16:creationId xmlns:a16="http://schemas.microsoft.com/office/drawing/2014/main" xmlns="" id="{D6B083CC-4209-47D3-8AFB-A755190E41BB}"/>
+                <a16:creationId xmlns="" xmlns:a16="http://schemas.microsoft.com/office/drawing/2014/main" id="{FECCCB1F-69D0-45C7-9A40-FAC731823900}"/>
               </a:ext>
             </a:extLst>
           </p:cNvPr>
@@ -11539,105 +11454,76 @@
             <p:ph type="title"/>
           </p:nvPr>
         </p:nvSpPr>
-        <p:spPr/>
-        <p:txBody>
-          <a:bodyPr>
-            <a:normAutofit/>
-          </a:bodyPr>
+        <p:spPr>
+          <a:xfrm>
+            <a:off x="238506" y="365126"/>
+            <a:ext cx="8771382" cy="1325563"/>
+          </a:xfrm>
+        </p:spPr>
+        <p:txBody>
+          <a:bodyPr/>
           <a:lstStyle/>
           <a:p>
             <a:r>
               <a:rPr lang="en-US"/>
-              <a:t>Observation: Off-the-shelf NER is Inadequate for Social Media</a:t>
-            </a:r>
-          </a:p>
-        </p:txBody>
-      </p:sp>
-      <p:sp>
-        <p:nvSpPr>
-          <p:cNvPr id="9" name="Content Placeholder 8">
+              <a:t>Powerful Tools Available</a:t>
+            </a:r>
+          </a:p>
+        </p:txBody>
+      </p:sp>
+      <p:pic>
+        <p:nvPicPr>
+          <p:cNvPr id="2050" name="Picture 2" descr="Image result for spacy ner">
             <a:extLst>
               <a:ext uri="{FF2B5EF4-FFF2-40B4-BE49-F238E27FC236}">
-                <a16:creationId xmlns:a16="http://schemas.microsoft.com/office/drawing/2014/main" xmlns="" id="{B1ED2A46-1714-4043-8859-0515A435A3E5}"/>
+                <a16:creationId xmlns="" xmlns:a16="http://schemas.microsoft.com/office/drawing/2014/main" id="{BF8CE563-B98B-4D8B-85DB-9319C6BB3BD6}"/>
               </a:ext>
             </a:extLst>
           </p:cNvPr>
-          <p:cNvSpPr>
-            <a:spLocks noGrp="1"/>
-          </p:cNvSpPr>
-          <p:nvPr>
-            <p:ph idx="1"/>
-          </p:nvPr>
-        </p:nvSpPr>
-        <p:spPr>
-          <a:xfrm>
-            <a:off x="609600" y="1825625"/>
-            <a:ext cx="7886700" cy="4351338"/>
-          </a:xfrm>
-        </p:spPr>
-        <p:txBody>
-          <a:bodyPr/>
-          <a:lstStyle/>
-          <a:p>
-            <a:r>
-              <a:rPr lang="en-US"/>
-              <a:t>Example: Stanford NER (off-the-shelf) vs. T-SEG (a Twitter-specific NER tool)</a:t>
-            </a:r>
-          </a:p>
-          <a:p>
-            <a:r>
-              <a:rPr lang="en-US"/>
-              <a:t>P, R and F1 below stand for Precision, Recall and F1-Measure resp. </a:t>
-            </a:r>
-          </a:p>
-        </p:txBody>
-      </p:sp>
-      <p:sp>
-        <p:nvSpPr>
-          <p:cNvPr id="10" name="TextBox 9">
+          <p:cNvPicPr>
+            <a:picLocks noChangeAspect="1" noChangeArrowheads="1"/>
+          </p:cNvPicPr>
+          <p:nvPr/>
+        </p:nvPicPr>
+        <p:blipFill>
+          <a:blip r:embed="rId2">
             <a:extLst>
-              <a:ext uri="{FF2B5EF4-FFF2-40B4-BE49-F238E27FC236}">
-                <a16:creationId xmlns:a16="http://schemas.microsoft.com/office/drawing/2014/main" xmlns="" id="{56F30D90-CBA2-46EA-91F2-0573C998920B}"/>
+              <a:ext uri="{28A0092B-C50C-407E-A947-70E740481C1C}">
+                <a14:useLocalDpi xmlns:a14="http://schemas.microsoft.com/office/drawing/2010/main" val="0"/>
               </a:ext>
             </a:extLst>
-          </p:cNvPr>
-          <p:cNvSpPr txBox="1"/>
-          <p:nvPr/>
-        </p:nvSpPr>
-        <p:spPr>
-          <a:xfrm>
-            <a:off x="6400800" y="6361629"/>
-            <a:ext cx="2668524" cy="369332"/>
+          </a:blip>
+          <a:srcRect/>
+          <a:stretch>
+            <a:fillRect/>
+          </a:stretch>
+        </p:blipFill>
+        <p:spPr bwMode="auto">
+          <a:xfrm>
+            <a:off x="829056" y="2029447"/>
+            <a:ext cx="3962400" cy="2066330"/>
           </a:xfrm>
           <a:prstGeom prst="rect">
             <a:avLst/>
           </a:prstGeom>
           <a:noFill/>
-        </p:spPr>
-        <p:txBody>
-          <a:bodyPr wrap="square" rtlCol="0">
-            <a:spAutoFit/>
-          </a:bodyPr>
-          <a:lstStyle/>
-          <a:p>
-            <a:pPr algn="r"/>
-            <a:r>
-              <a:rPr lang="en-US">
+          <a:extLst>
+            <a:ext uri="{909E8E84-426E-40DD-AFC4-6F175D3DCCD1}">
+              <a14:hiddenFill xmlns:a14="http://schemas.microsoft.com/office/drawing/2010/main">
                 <a:solidFill>
-                  <a:srgbClr val="002060"/>
+                  <a:srgbClr val="FFFFFF"/>
                 </a:solidFill>
-              </a:rPr>
-              <a:t>(Ritter et al., 2011)</a:t>
-            </a:r>
-          </a:p>
-        </p:txBody>
-      </p:sp>
+              </a14:hiddenFill>
+            </a:ext>
+          </a:extLst>
+        </p:spPr>
+      </p:pic>
       <p:pic>
         <p:nvPicPr>
-          <p:cNvPr id="11" name="Picture 10">
+          <p:cNvPr id="7" name="Picture 6">
             <a:extLst>
               <a:ext uri="{FF2B5EF4-FFF2-40B4-BE49-F238E27FC236}">
-                <a16:creationId xmlns:a16="http://schemas.microsoft.com/office/drawing/2014/main" xmlns="" id="{139CD10C-D795-43F9-9BE2-0158C5C25AF2}"/>
+                <a16:creationId xmlns="" xmlns:a16="http://schemas.microsoft.com/office/drawing/2014/main" id="{C9D1664F-3E2D-44D1-869B-2D54C62EACC8}"/>
               </a:ext>
             </a:extLst>
           </p:cNvPr>
@@ -11647,25 +11533,264 @@
           <p:nvPr/>
         </p:nvPicPr>
         <p:blipFill>
-          <a:blip r:embed="rId2"/>
+          <a:blip r:embed="rId3"/>
           <a:stretch>
             <a:fillRect/>
           </a:stretch>
         </p:blipFill>
         <p:spPr>
           <a:xfrm>
-            <a:off x="1006602" y="3473196"/>
-            <a:ext cx="7090456" cy="2435543"/>
+            <a:off x="4005262" y="4565120"/>
+            <a:ext cx="4090226" cy="2130600"/>
           </a:xfrm>
           <a:prstGeom prst="rect">
             <a:avLst/>
           </a:prstGeom>
         </p:spPr>
       </p:pic>
+      <p:pic>
+        <p:nvPicPr>
+          <p:cNvPr id="8" name="Picture 7">
+            <a:extLst>
+              <a:ext uri="{FF2B5EF4-FFF2-40B4-BE49-F238E27FC236}">
+                <a16:creationId xmlns="" xmlns:a16="http://schemas.microsoft.com/office/drawing/2014/main" id="{7DEDEEDD-DFDA-43E7-BDEF-132D6284F67E}"/>
+              </a:ext>
+            </a:extLst>
+          </p:cNvPr>
+          <p:cNvPicPr>
+            <a:picLocks noChangeAspect="1"/>
+          </p:cNvPicPr>
+          <p:nvPr/>
+        </p:nvPicPr>
+        <p:blipFill>
+          <a:blip r:embed="rId4"/>
+          <a:stretch>
+            <a:fillRect/>
+          </a:stretch>
+        </p:blipFill>
+        <p:spPr>
+          <a:xfrm>
+            <a:off x="505968" y="3730017"/>
+            <a:ext cx="3284692" cy="2463519"/>
+          </a:xfrm>
+          <a:prstGeom prst="rect">
+            <a:avLst/>
+          </a:prstGeom>
+        </p:spPr>
+      </p:pic>
+      <p:pic>
+        <p:nvPicPr>
+          <p:cNvPr id="9" name="Picture 8">
+            <a:extLst>
+              <a:ext uri="{FF2B5EF4-FFF2-40B4-BE49-F238E27FC236}">
+                <a16:creationId xmlns="" xmlns:a16="http://schemas.microsoft.com/office/drawing/2014/main" id="{5BF4D1C3-2098-4FA9-9AE9-B6310FFD0382}"/>
+              </a:ext>
+            </a:extLst>
+          </p:cNvPr>
+          <p:cNvPicPr>
+            <a:picLocks noChangeAspect="1"/>
+          </p:cNvPicPr>
+          <p:nvPr/>
+        </p:nvPicPr>
+        <p:blipFill>
+          <a:blip r:embed="rId5"/>
+          <a:stretch>
+            <a:fillRect/>
+          </a:stretch>
+        </p:blipFill>
+        <p:spPr>
+          <a:xfrm>
+            <a:off x="4274112" y="2602471"/>
+            <a:ext cx="1757118" cy="1757118"/>
+          </a:xfrm>
+          <a:prstGeom prst="rect">
+            <a:avLst/>
+          </a:prstGeom>
+        </p:spPr>
+      </p:pic>
+      <p:pic>
+        <p:nvPicPr>
+          <p:cNvPr id="10" name="Picture 9">
+            <a:extLst>
+              <a:ext uri="{FF2B5EF4-FFF2-40B4-BE49-F238E27FC236}">
+                <a16:creationId xmlns="" xmlns:a16="http://schemas.microsoft.com/office/drawing/2014/main" id="{F6D94560-CDCC-433E-9834-5916B450239B}"/>
+              </a:ext>
+            </a:extLst>
+          </p:cNvPr>
+          <p:cNvPicPr>
+            <a:picLocks noChangeAspect="1"/>
+          </p:cNvPicPr>
+          <p:nvPr/>
+        </p:nvPicPr>
+        <p:blipFill>
+          <a:blip r:embed="rId6"/>
+          <a:stretch>
+            <a:fillRect/>
+          </a:stretch>
+        </p:blipFill>
+        <p:spPr>
+          <a:xfrm>
+            <a:off x="6567678" y="3299670"/>
+            <a:ext cx="2442210" cy="1059919"/>
+          </a:xfrm>
+          <a:prstGeom prst="rect">
+            <a:avLst/>
+          </a:prstGeom>
+        </p:spPr>
+      </p:pic>
+      <p:pic>
+        <p:nvPicPr>
+          <p:cNvPr id="11" name="Picture 10">
+            <a:extLst>
+              <a:ext uri="{FF2B5EF4-FFF2-40B4-BE49-F238E27FC236}">
+                <a16:creationId xmlns="" xmlns:a16="http://schemas.microsoft.com/office/drawing/2014/main" id="{CBF3A1EB-BA6B-484A-AA20-176F12D326FF}"/>
+              </a:ext>
+            </a:extLst>
+          </p:cNvPr>
+          <p:cNvPicPr>
+            <a:picLocks noChangeAspect="1"/>
+          </p:cNvPicPr>
+          <p:nvPr/>
+        </p:nvPicPr>
+        <p:blipFill>
+          <a:blip r:embed="rId7"/>
+          <a:stretch>
+            <a:fillRect/>
+          </a:stretch>
+        </p:blipFill>
+        <p:spPr>
+          <a:xfrm>
+            <a:off x="5903770" y="1342696"/>
+            <a:ext cx="3106118" cy="1619960"/>
+          </a:xfrm>
+          <a:prstGeom prst="rect">
+            <a:avLst/>
+          </a:prstGeom>
+        </p:spPr>
+      </p:pic>
+      <p:sp>
+        <p:nvSpPr>
+          <p:cNvPr id="12" name="Rectangle 11">
+            <a:extLst>
+              <a:ext uri="{FF2B5EF4-FFF2-40B4-BE49-F238E27FC236}">
+                <a16:creationId xmlns="" xmlns:a16="http://schemas.microsoft.com/office/drawing/2014/main" id="{30DBC704-3387-4A5D-A8E1-6CA6EEB5ADF6}"/>
+              </a:ext>
+            </a:extLst>
+          </p:cNvPr>
+          <p:cNvSpPr/>
+          <p:nvPr/>
+        </p:nvSpPr>
+        <p:spPr>
+          <a:xfrm>
+            <a:off x="182880" y="1450849"/>
+            <a:ext cx="8827008" cy="5035296"/>
+          </a:xfrm>
+          <a:prstGeom prst="rect">
+            <a:avLst/>
+          </a:prstGeom>
+          <a:solidFill>
+            <a:schemeClr val="accent6">
+              <a:lumMod val="40000"/>
+              <a:lumOff val="60000"/>
+              <a:alpha val="93000"/>
+            </a:schemeClr>
+          </a:solidFill>
+          <a:ln>
+            <a:noFill/>
+          </a:ln>
+        </p:spPr>
+        <p:style>
+          <a:lnRef idx="2">
+            <a:schemeClr val="accent1">
+              <a:shade val="50000"/>
+            </a:schemeClr>
+          </a:lnRef>
+          <a:fillRef idx="1">
+            <a:schemeClr val="accent1"/>
+          </a:fillRef>
+          <a:effectRef idx="0">
+            <a:schemeClr val="accent1"/>
+          </a:effectRef>
+          <a:fontRef idx="minor">
+            <a:schemeClr val="lt1"/>
+          </a:fontRef>
+        </p:style>
+        <p:txBody>
+          <a:bodyPr rtlCol="0" anchor="ctr"/>
+          <a:lstStyle/>
+          <a:p>
+            <a:pPr algn="ctr"/>
+            <a:endParaRPr lang="en-US"/>
+          </a:p>
+        </p:txBody>
+      </p:sp>
+      <p:sp>
+        <p:nvSpPr>
+          <p:cNvPr id="13" name="Title 1">
+            <a:extLst>
+              <a:ext uri="{FF2B5EF4-FFF2-40B4-BE49-F238E27FC236}">
+                <a16:creationId xmlns="" xmlns:a16="http://schemas.microsoft.com/office/drawing/2014/main" id="{95A38355-5A7F-4B61-8049-EB7D4C4B3DC5}"/>
+              </a:ext>
+            </a:extLst>
+          </p:cNvPr>
+          <p:cNvSpPr txBox="1">
+            <a:spLocks/>
+          </p:cNvSpPr>
+          <p:nvPr/>
+        </p:nvSpPr>
+        <p:spPr>
+          <a:xfrm>
+            <a:off x="660399" y="3281046"/>
+            <a:ext cx="7509933" cy="2387600"/>
+          </a:xfrm>
+          <a:prstGeom prst="rect">
+            <a:avLst/>
+          </a:prstGeom>
+        </p:spPr>
+        <p:txBody>
+          <a:bodyPr vert="horz" lIns="91440" tIns="45720" rIns="91440" bIns="45720" rtlCol="0" anchor="ctr">
+            <a:normAutofit/>
+          </a:bodyPr>
+          <a:lstStyle>
+            <a:lvl1pPr algn="l" defTabSz="914400" rtl="0" eaLnBrk="1" latinLnBrk="0" hangingPunct="1">
+              <a:lnSpc>
+                <a:spcPct val="90000"/>
+              </a:lnSpc>
+              <a:spcBef>
+                <a:spcPct val="0"/>
+              </a:spcBef>
+              <a:buNone/>
+              <a:defRPr sz="4400" kern="1200">
+                <a:solidFill>
+                  <a:schemeClr val="tx1"/>
+                </a:solidFill>
+                <a:latin typeface="+mj-lt"/>
+                <a:ea typeface="+mj-ea"/>
+                <a:cs typeface="+mj-cs"/>
+              </a:defRPr>
+            </a:lvl1pPr>
+          </a:lstStyle>
+          <a:p>
+            <a:r>
+              <a:rPr lang="en-US" sz="4000" b="1">
+                <a:solidFill>
+                  <a:srgbClr val="002060"/>
+                </a:solidFill>
+              </a:rPr>
+              <a:t>Tools like SpaCy and Stanford NER can work directly with embeddings</a:t>
+            </a:r>
+            <a:endParaRPr lang="en-US" sz="4000" b="1" dirty="0">
+              <a:solidFill>
+                <a:srgbClr val="002060"/>
+              </a:solidFill>
+            </a:endParaRPr>
+          </a:p>
+        </p:txBody>
+      </p:sp>
     </p:spTree>
     <p:extLst>
       <p:ext uri="{BB962C8B-B14F-4D97-AF65-F5344CB8AC3E}">
-        <p14:creationId xmlns:p14="http://schemas.microsoft.com/office/powerpoint/2010/main" val="1753429276"/>
+        <p14:creationId xmlns:p14="http://schemas.microsoft.com/office/powerpoint/2010/main" val="454712633"/>
       </p:ext>
     </p:extLst>
   </p:cSld>
@@ -11704,7 +11829,7 @@
           <p:cNvPr id="2" name="Title 1">
             <a:extLst>
               <a:ext uri="{FF2B5EF4-FFF2-40B4-BE49-F238E27FC236}">
-                <a16:creationId xmlns:a16="http://schemas.microsoft.com/office/drawing/2014/main" xmlns="" id="{D6B083CC-4209-47D3-8AFB-A755190E41BB}"/>
+                <a16:creationId xmlns="" xmlns:a16="http://schemas.microsoft.com/office/drawing/2014/main" id="{FECCCB1F-69D0-45C7-9A40-FAC731823900}"/>
               </a:ext>
             </a:extLst>
           </p:cNvPr>
@@ -11715,65 +11840,76 @@
             <p:ph type="title"/>
           </p:nvPr>
         </p:nvSpPr>
-        <p:spPr/>
-        <p:txBody>
-          <a:bodyPr>
-            <a:normAutofit/>
-          </a:bodyPr>
+        <p:spPr>
+          <a:xfrm>
+            <a:off x="238506" y="365126"/>
+            <a:ext cx="8771382" cy="1325563"/>
+          </a:xfrm>
+        </p:spPr>
+        <p:txBody>
+          <a:bodyPr/>
           <a:lstStyle/>
           <a:p>
             <a:r>
               <a:rPr lang="en-US"/>
-              <a:t>Observation: Off-the-shelf NER is Inadequate for Social Media</a:t>
-            </a:r>
-          </a:p>
-        </p:txBody>
-      </p:sp>
-      <p:sp>
-        <p:nvSpPr>
-          <p:cNvPr id="9" name="Content Placeholder 8">
+              <a:t>Powerful Tools Available</a:t>
+            </a:r>
+          </a:p>
+        </p:txBody>
+      </p:sp>
+      <p:pic>
+        <p:nvPicPr>
+          <p:cNvPr id="2050" name="Picture 2" descr="Image result for spacy ner">
             <a:extLst>
               <a:ext uri="{FF2B5EF4-FFF2-40B4-BE49-F238E27FC236}">
-                <a16:creationId xmlns:a16="http://schemas.microsoft.com/office/drawing/2014/main" xmlns="" id="{B1ED2A46-1714-4043-8859-0515A435A3E5}"/>
+                <a16:creationId xmlns="" xmlns:a16="http://schemas.microsoft.com/office/drawing/2014/main" id="{BF8CE563-B98B-4D8B-85DB-9319C6BB3BD6}"/>
               </a:ext>
             </a:extLst>
           </p:cNvPr>
-          <p:cNvSpPr>
-            <a:spLocks noGrp="1"/>
-          </p:cNvSpPr>
-          <p:nvPr>
-            <p:ph idx="1"/>
-          </p:nvPr>
-        </p:nvSpPr>
-        <p:spPr>
-          <a:xfrm>
-            <a:off x="609600" y="1825625"/>
-            <a:ext cx="7886700" cy="4351338"/>
-          </a:xfrm>
-        </p:spPr>
-        <p:txBody>
-          <a:bodyPr/>
-          <a:lstStyle/>
-          <a:p>
-            <a:r>
-              <a:rPr lang="en-US"/>
-              <a:t>Example: Stanford NER (off-the-shelf) vs. T-SEG (a Twitter-specific NER tool)</a:t>
-            </a:r>
-          </a:p>
-          <a:p>
-            <a:r>
-              <a:rPr lang="en-US"/>
-              <a:t>P, R and F1 below stand for Precision, Recall and F1-Measure resp. </a:t>
-            </a:r>
-          </a:p>
-        </p:txBody>
-      </p:sp>
+          <p:cNvPicPr>
+            <a:picLocks noChangeAspect="1" noChangeArrowheads="1"/>
+          </p:cNvPicPr>
+          <p:nvPr/>
+        </p:nvPicPr>
+        <p:blipFill>
+          <a:blip r:embed="rId2">
+            <a:extLst>
+              <a:ext uri="{28A0092B-C50C-407E-A947-70E740481C1C}">
+                <a14:useLocalDpi xmlns:a14="http://schemas.microsoft.com/office/drawing/2010/main" val="0"/>
+              </a:ext>
+            </a:extLst>
+          </a:blip>
+          <a:srcRect/>
+          <a:stretch>
+            <a:fillRect/>
+          </a:stretch>
+        </p:blipFill>
+        <p:spPr bwMode="auto">
+          <a:xfrm>
+            <a:off x="829056" y="2029447"/>
+            <a:ext cx="3962400" cy="2066330"/>
+          </a:xfrm>
+          <a:prstGeom prst="rect">
+            <a:avLst/>
+          </a:prstGeom>
+          <a:noFill/>
+          <a:extLst>
+            <a:ext uri="{909E8E84-426E-40DD-AFC4-6F175D3DCCD1}">
+              <a14:hiddenFill xmlns:a14="http://schemas.microsoft.com/office/drawing/2010/main">
+                <a:solidFill>
+                  <a:srgbClr val="FFFFFF"/>
+                </a:solidFill>
+              </a14:hiddenFill>
+            </a:ext>
+          </a:extLst>
+        </p:spPr>
+      </p:pic>
       <p:pic>
         <p:nvPicPr>
-          <p:cNvPr id="11" name="Picture 10">
+          <p:cNvPr id="7" name="Picture 6">
             <a:extLst>
               <a:ext uri="{FF2B5EF4-FFF2-40B4-BE49-F238E27FC236}">
-                <a16:creationId xmlns:a16="http://schemas.microsoft.com/office/drawing/2014/main" xmlns="" id="{139CD10C-D795-43F9-9BE2-0158C5C25AF2}"/>
+                <a16:creationId xmlns="" xmlns:a16="http://schemas.microsoft.com/office/drawing/2014/main" id="{C9D1664F-3E2D-44D1-869B-2D54C62EACC8}"/>
               </a:ext>
             </a:extLst>
           </p:cNvPr>
@@ -11790,20 +11926,140 @@
         </p:blipFill>
         <p:spPr>
           <a:xfrm>
-            <a:off x="1006602" y="3473196"/>
-            <a:ext cx="7090456" cy="2435543"/>
+            <a:off x="4005262" y="4565120"/>
+            <a:ext cx="4090226" cy="2130600"/>
           </a:xfrm>
           <a:prstGeom prst="rect">
             <a:avLst/>
           </a:prstGeom>
         </p:spPr>
       </p:pic>
-      <p:sp>
-        <p:nvSpPr>
-          <p:cNvPr id="8" name="Rectangle 7">
+      <p:pic>
+        <p:nvPicPr>
+          <p:cNvPr id="8" name="Picture 7">
             <a:extLst>
               <a:ext uri="{FF2B5EF4-FFF2-40B4-BE49-F238E27FC236}">
-                <a16:creationId xmlns:a16="http://schemas.microsoft.com/office/drawing/2014/main" xmlns="" id="{99016647-0CBA-4CDC-A66E-8FCBED8E4481}"/>
+                <a16:creationId xmlns="" xmlns:a16="http://schemas.microsoft.com/office/drawing/2014/main" id="{7DEDEEDD-DFDA-43E7-BDEF-132D6284F67E}"/>
+              </a:ext>
+            </a:extLst>
+          </p:cNvPr>
+          <p:cNvPicPr>
+            <a:picLocks noChangeAspect="1"/>
+          </p:cNvPicPr>
+          <p:nvPr/>
+        </p:nvPicPr>
+        <p:blipFill>
+          <a:blip r:embed="rId4"/>
+          <a:stretch>
+            <a:fillRect/>
+          </a:stretch>
+        </p:blipFill>
+        <p:spPr>
+          <a:xfrm>
+            <a:off x="505968" y="3730017"/>
+            <a:ext cx="3284692" cy="2463519"/>
+          </a:xfrm>
+          <a:prstGeom prst="rect">
+            <a:avLst/>
+          </a:prstGeom>
+        </p:spPr>
+      </p:pic>
+      <p:pic>
+        <p:nvPicPr>
+          <p:cNvPr id="9" name="Picture 8">
+            <a:extLst>
+              <a:ext uri="{FF2B5EF4-FFF2-40B4-BE49-F238E27FC236}">
+                <a16:creationId xmlns="" xmlns:a16="http://schemas.microsoft.com/office/drawing/2014/main" id="{5BF4D1C3-2098-4FA9-9AE9-B6310FFD0382}"/>
+              </a:ext>
+            </a:extLst>
+          </p:cNvPr>
+          <p:cNvPicPr>
+            <a:picLocks noChangeAspect="1"/>
+          </p:cNvPicPr>
+          <p:nvPr/>
+        </p:nvPicPr>
+        <p:blipFill>
+          <a:blip r:embed="rId5"/>
+          <a:stretch>
+            <a:fillRect/>
+          </a:stretch>
+        </p:blipFill>
+        <p:spPr>
+          <a:xfrm>
+            <a:off x="4274112" y="2602471"/>
+            <a:ext cx="1757118" cy="1757118"/>
+          </a:xfrm>
+          <a:prstGeom prst="rect">
+            <a:avLst/>
+          </a:prstGeom>
+        </p:spPr>
+      </p:pic>
+      <p:pic>
+        <p:nvPicPr>
+          <p:cNvPr id="10" name="Picture 9">
+            <a:extLst>
+              <a:ext uri="{FF2B5EF4-FFF2-40B4-BE49-F238E27FC236}">
+                <a16:creationId xmlns="" xmlns:a16="http://schemas.microsoft.com/office/drawing/2014/main" id="{F6D94560-CDCC-433E-9834-5916B450239B}"/>
+              </a:ext>
+            </a:extLst>
+          </p:cNvPr>
+          <p:cNvPicPr>
+            <a:picLocks noChangeAspect="1"/>
+          </p:cNvPicPr>
+          <p:nvPr/>
+        </p:nvPicPr>
+        <p:blipFill>
+          <a:blip r:embed="rId6"/>
+          <a:stretch>
+            <a:fillRect/>
+          </a:stretch>
+        </p:blipFill>
+        <p:spPr>
+          <a:xfrm>
+            <a:off x="6567678" y="3299670"/>
+            <a:ext cx="2442210" cy="1059919"/>
+          </a:xfrm>
+          <a:prstGeom prst="rect">
+            <a:avLst/>
+          </a:prstGeom>
+        </p:spPr>
+      </p:pic>
+      <p:pic>
+        <p:nvPicPr>
+          <p:cNvPr id="11" name="Picture 10">
+            <a:extLst>
+              <a:ext uri="{FF2B5EF4-FFF2-40B4-BE49-F238E27FC236}">
+                <a16:creationId xmlns="" xmlns:a16="http://schemas.microsoft.com/office/drawing/2014/main" id="{CBF3A1EB-BA6B-484A-AA20-176F12D326FF}"/>
+              </a:ext>
+            </a:extLst>
+          </p:cNvPr>
+          <p:cNvPicPr>
+            <a:picLocks noChangeAspect="1"/>
+          </p:cNvPicPr>
+          <p:nvPr/>
+        </p:nvPicPr>
+        <p:blipFill>
+          <a:blip r:embed="rId7"/>
+          <a:stretch>
+            <a:fillRect/>
+          </a:stretch>
+        </p:blipFill>
+        <p:spPr>
+          <a:xfrm>
+            <a:off x="5903770" y="1342696"/>
+            <a:ext cx="3106118" cy="1619960"/>
+          </a:xfrm>
+          <a:prstGeom prst="rect">
+            <a:avLst/>
+          </a:prstGeom>
+        </p:spPr>
+      </p:pic>
+      <p:sp>
+        <p:nvSpPr>
+          <p:cNvPr id="12" name="Rectangle 11">
+            <a:extLst>
+              <a:ext uri="{FF2B5EF4-FFF2-40B4-BE49-F238E27FC236}">
+                <a16:creationId xmlns="" xmlns:a16="http://schemas.microsoft.com/office/drawing/2014/main" id="{30DBC704-3387-4A5D-A8E1-6CA6EEB5ADF6}"/>
               </a:ext>
             </a:extLst>
           </p:cNvPr>
@@ -11812,8 +12068,8 @@
         </p:nvSpPr>
         <p:spPr>
           <a:xfrm>
-            <a:off x="304800" y="1690689"/>
-            <a:ext cx="8595360" cy="1930335"/>
+            <a:off x="182880" y="1450849"/>
+            <a:ext cx="8827008" cy="5035296"/>
           </a:xfrm>
           <a:prstGeom prst="rect">
             <a:avLst/>
@@ -11856,182 +12112,71 @@
       </p:sp>
       <p:sp>
         <p:nvSpPr>
-          <p:cNvPr id="4" name="TextBox 3">
+          <p:cNvPr id="13" name="Title 1">
             <a:extLst>
               <a:ext uri="{FF2B5EF4-FFF2-40B4-BE49-F238E27FC236}">
-                <a16:creationId xmlns:a16="http://schemas.microsoft.com/office/drawing/2014/main" xmlns="" id="{4B33F1C3-6003-4D94-915E-6A63B46DBE1C}"/>
+                <a16:creationId xmlns="" xmlns:a16="http://schemas.microsoft.com/office/drawing/2014/main" id="{95A38355-5A7F-4B61-8049-EB7D4C4B3DC5}"/>
               </a:ext>
             </a:extLst>
           </p:cNvPr>
-          <p:cNvSpPr txBox="1"/>
+          <p:cNvSpPr txBox="1">
+            <a:spLocks/>
+          </p:cNvSpPr>
           <p:nvPr/>
         </p:nvSpPr>
         <p:spPr>
           <a:xfrm>
-            <a:off x="900685" y="2042602"/>
-            <a:ext cx="7595615" cy="1569660"/>
+            <a:off x="1914144" y="3281046"/>
+            <a:ext cx="5669280" cy="2387600"/>
           </a:xfrm>
           <a:prstGeom prst="rect">
             <a:avLst/>
           </a:prstGeom>
-          <a:noFill/>
-        </p:spPr>
-        <p:txBody>
-          <a:bodyPr wrap="square" rtlCol="0">
-            <a:spAutoFit/>
+        </p:spPr>
+        <p:txBody>
+          <a:bodyPr vert="horz" lIns="91440" tIns="45720" rIns="91440" bIns="45720" rtlCol="0" anchor="ctr">
+            <a:normAutofit/>
           </a:bodyPr>
-          <a:lstStyle/>
-          <a:p>
-            <a:pPr algn="ctr"/>
-            <a:r>
-              <a:rPr lang="en-US" sz="3200">
+          <a:lstStyle>
+            <a:lvl1pPr algn="l" defTabSz="914400" rtl="0" eaLnBrk="1" latinLnBrk="0" hangingPunct="1">
+              <a:lnSpc>
+                <a:spcPct val="90000"/>
+              </a:lnSpc>
+              <a:spcBef>
+                <a:spcPct val="0"/>
+              </a:spcBef>
+              <a:buNone/>
+              <a:defRPr sz="4400" kern="1200">
                 <a:solidFill>
-                  <a:srgbClr val="FF0000"/>
+                  <a:schemeClr val="tx1"/>
                 </a:solidFill>
-              </a:rPr>
-              <a:t>Training Twitter-specific models and using Twitter-specific features offers significant performance advantages</a:t>
-            </a:r>
-          </a:p>
-        </p:txBody>
-      </p:sp>
-      <p:sp>
-        <p:nvSpPr>
-          <p:cNvPr id="3" name="Oval 2">
-            <a:extLst>
-              <a:ext uri="{FF2B5EF4-FFF2-40B4-BE49-F238E27FC236}">
-                <a16:creationId xmlns:a16="http://schemas.microsoft.com/office/drawing/2014/main" xmlns="" id="{A6AA111D-A7A9-4A20-AA18-6ABD3344B561}"/>
-              </a:ext>
-            </a:extLst>
-          </p:cNvPr>
-          <p:cNvSpPr/>
-          <p:nvPr/>
-        </p:nvSpPr>
-        <p:spPr>
-          <a:xfrm>
-            <a:off x="6693408" y="3473196"/>
-            <a:ext cx="1281730" cy="2574036"/>
-          </a:xfrm>
-          <a:prstGeom prst="ellipse">
-            <a:avLst/>
-          </a:prstGeom>
-          <a:noFill/>
-          <a:ln w="38100">
-            <a:solidFill>
-              <a:srgbClr val="FF0000"/>
-            </a:solidFill>
-          </a:ln>
-        </p:spPr>
-        <p:style>
-          <a:lnRef idx="2">
-            <a:schemeClr val="accent1">
-              <a:shade val="50000"/>
-            </a:schemeClr>
-          </a:lnRef>
-          <a:fillRef idx="1">
-            <a:schemeClr val="accent1"/>
-          </a:fillRef>
-          <a:effectRef idx="0">
-            <a:schemeClr val="accent1"/>
-          </a:effectRef>
-          <a:fontRef idx="minor">
-            <a:schemeClr val="lt1"/>
-          </a:fontRef>
-        </p:style>
-        <p:txBody>
-          <a:bodyPr rtlCol="0" anchor="ctr"/>
-          <a:lstStyle/>
-          <a:p>
-            <a:pPr algn="ctr"/>
-            <a:endParaRPr lang="en-US"/>
-          </a:p>
-        </p:txBody>
-      </p:sp>
-      <p:cxnSp>
-        <p:nvCxnSpPr>
-          <p:cNvPr id="6" name="Straight Arrow Connector 5">
-            <a:extLst>
-              <a:ext uri="{FF2B5EF4-FFF2-40B4-BE49-F238E27FC236}">
-                <a16:creationId xmlns:a16="http://schemas.microsoft.com/office/drawing/2014/main" xmlns="" id="{61BDA680-BA2B-49A7-BB1B-55390EF54BAA}"/>
-              </a:ext>
-            </a:extLst>
-          </p:cNvPr>
-          <p:cNvCxnSpPr/>
-          <p:nvPr/>
-        </p:nvCxnSpPr>
-        <p:spPr>
-          <a:xfrm>
-            <a:off x="4645152" y="3473196"/>
-            <a:ext cx="2170176" cy="428244"/>
-          </a:xfrm>
-          <a:prstGeom prst="straightConnector1">
-            <a:avLst/>
-          </a:prstGeom>
-          <a:ln>
-            <a:solidFill>
-              <a:srgbClr val="FF0000"/>
-            </a:solidFill>
-            <a:tailEnd type="triangle"/>
-          </a:ln>
-        </p:spPr>
-        <p:style>
-          <a:lnRef idx="1">
-            <a:schemeClr val="accent1"/>
-          </a:lnRef>
-          <a:fillRef idx="0">
-            <a:schemeClr val="accent1"/>
-          </a:fillRef>
-          <a:effectRef idx="0">
-            <a:schemeClr val="accent1"/>
-          </a:effectRef>
-          <a:fontRef idx="minor">
-            <a:schemeClr val="tx1"/>
-          </a:fontRef>
-        </p:style>
-      </p:cxnSp>
-      <p:sp>
-        <p:nvSpPr>
-          <p:cNvPr id="12" name="TextBox 11">
-            <a:extLst>
-              <a:ext uri="{FF2B5EF4-FFF2-40B4-BE49-F238E27FC236}">
-                <a16:creationId xmlns:a16="http://schemas.microsoft.com/office/drawing/2014/main" xmlns="" id="{A9662CE1-4096-4132-B041-42E280DDC82E}"/>
-              </a:ext>
-            </a:extLst>
-          </p:cNvPr>
-          <p:cNvSpPr txBox="1"/>
-          <p:nvPr/>
-        </p:nvSpPr>
-        <p:spPr>
-          <a:xfrm>
-            <a:off x="6400800" y="6361629"/>
-            <a:ext cx="2668524" cy="369332"/>
-          </a:xfrm>
-          <a:prstGeom prst="rect">
-            <a:avLst/>
-          </a:prstGeom>
-          <a:noFill/>
-        </p:spPr>
-        <p:txBody>
-          <a:bodyPr wrap="square" rtlCol="0">
-            <a:spAutoFit/>
-          </a:bodyPr>
-          <a:lstStyle/>
-          <a:p>
-            <a:pPr algn="r"/>
-            <a:r>
-              <a:rPr lang="en-US">
+                <a:latin typeface="+mj-lt"/>
+                <a:ea typeface="+mj-ea"/>
+                <a:cs typeface="+mj-cs"/>
+              </a:defRPr>
+            </a:lvl1pPr>
+          </a:lstStyle>
+          <a:p>
+            <a:r>
+              <a:rPr lang="en-US" b="1">
                 <a:solidFill>
                   <a:srgbClr val="002060"/>
                 </a:solidFill>
               </a:rPr>
-              <a:t>(Ritter et al., 2011)</a:t>
-            </a:r>
+              <a:t>Demonstration of SpaCy</a:t>
+            </a:r>
+            <a:endParaRPr lang="en-US" b="1" dirty="0">
+              <a:solidFill>
+                <a:srgbClr val="002060"/>
+              </a:solidFill>
+            </a:endParaRPr>
           </a:p>
         </p:txBody>
       </p:sp>
     </p:spTree>
     <p:extLst>
       <p:ext uri="{BB962C8B-B14F-4D97-AF65-F5344CB8AC3E}">
-        <p14:creationId xmlns:p14="http://schemas.microsoft.com/office/powerpoint/2010/main" val="155772102"/>
+        <p14:creationId xmlns:p14="http://schemas.microsoft.com/office/powerpoint/2010/main" val="21837528"/>
       </p:ext>
     </p:extLst>
   </p:cSld>
@@ -12067,10 +12212,10 @@
       </p:grpSpPr>
       <p:sp>
         <p:nvSpPr>
-          <p:cNvPr id="2" name="Title 1">
+          <p:cNvPr id="9" name="Content Placeholder 8">
             <a:extLst>
               <a:ext uri="{FF2B5EF4-FFF2-40B4-BE49-F238E27FC236}">
-                <a16:creationId xmlns:a16="http://schemas.microsoft.com/office/drawing/2014/main" xmlns="" id="{FECCCB1F-69D0-45C7-9A40-FAC731823900}"/>
+                <a16:creationId xmlns="" xmlns:a16="http://schemas.microsoft.com/office/drawing/2014/main" id="{B1ED2A46-1714-4043-8859-0515A435A3E5}"/>
               </a:ext>
             </a:extLst>
           </p:cNvPr>
@@ -12078,13 +12223,13 @@
             <a:spLocks noGrp="1"/>
           </p:cNvSpPr>
           <p:nvPr>
-            <p:ph type="title"/>
+            <p:ph idx="1"/>
           </p:nvPr>
         </p:nvSpPr>
         <p:spPr>
           <a:xfrm>
-            <a:off x="238506" y="365126"/>
-            <a:ext cx="8771382" cy="1325563"/>
+            <a:off x="609600" y="1825625"/>
+            <a:ext cx="7886700" cy="4351338"/>
           </a:xfrm>
         </p:spPr>
         <p:txBody>
@@ -12092,65 +12237,68 @@
           <a:lstStyle/>
           <a:p>
             <a:r>
+              <a:rPr lang="en-US" b="1"/>
+              <a:t>Example:</a:t>
+            </a:r>
+            <a:r>
               <a:rPr lang="en-US"/>
-              <a:t>Powerful Tools and Packages Available</a:t>
-            </a:r>
-          </a:p>
-        </p:txBody>
-      </p:sp>
-      <p:pic>
-        <p:nvPicPr>
-          <p:cNvPr id="2050" name="Picture 2" descr="Image result for spacy ner">
+              <a:t> Stanford NER (off-the-shelf) vs. T-SEG (a Twitter-specific NER tool)</a:t>
+            </a:r>
+          </a:p>
+          <a:p>
+            <a:r>
+              <a:rPr lang="en-US"/>
+              <a:t>P, R and F1 below stand for Precision, Recall and F1-Measure resp. </a:t>
+            </a:r>
+          </a:p>
+        </p:txBody>
+      </p:sp>
+      <p:sp>
+        <p:nvSpPr>
+          <p:cNvPr id="10" name="TextBox 9">
             <a:extLst>
               <a:ext uri="{FF2B5EF4-FFF2-40B4-BE49-F238E27FC236}">
-                <a16:creationId xmlns:a16="http://schemas.microsoft.com/office/drawing/2014/main" xmlns="" id="{BF8CE563-B98B-4D8B-85DB-9319C6BB3BD6}"/>
+                <a16:creationId xmlns="" xmlns:a16="http://schemas.microsoft.com/office/drawing/2014/main" id="{56F30D90-CBA2-46EA-91F2-0573C998920B}"/>
               </a:ext>
             </a:extLst>
           </p:cNvPr>
-          <p:cNvPicPr>
-            <a:picLocks noChangeAspect="1" noChangeArrowheads="1"/>
-          </p:cNvPicPr>
+          <p:cNvSpPr txBox="1"/>
           <p:nvPr/>
-        </p:nvPicPr>
-        <p:blipFill>
-          <a:blip r:embed="rId2">
-            <a:extLst>
-              <a:ext uri="{28A0092B-C50C-407E-A947-70E740481C1C}">
-                <a14:useLocalDpi xmlns:a14="http://schemas.microsoft.com/office/drawing/2010/main" val="0"/>
-              </a:ext>
-            </a:extLst>
-          </a:blip>
-          <a:srcRect/>
-          <a:stretch>
-            <a:fillRect/>
-          </a:stretch>
-        </p:blipFill>
-        <p:spPr bwMode="auto">
-          <a:xfrm>
-            <a:off x="829056" y="2029447"/>
-            <a:ext cx="3962400" cy="2066330"/>
+        </p:nvSpPr>
+        <p:spPr>
+          <a:xfrm>
+            <a:off x="6400800" y="6361629"/>
+            <a:ext cx="2668524" cy="369332"/>
           </a:xfrm>
           <a:prstGeom prst="rect">
             <a:avLst/>
           </a:prstGeom>
           <a:noFill/>
-          <a:extLst>
-            <a:ext uri="{909E8E84-426E-40DD-AFC4-6F175D3DCCD1}">
-              <a14:hiddenFill xmlns:a14="http://schemas.microsoft.com/office/drawing/2010/main">
+        </p:spPr>
+        <p:txBody>
+          <a:bodyPr wrap="square" rtlCol="0">
+            <a:spAutoFit/>
+          </a:bodyPr>
+          <a:lstStyle/>
+          <a:p>
+            <a:pPr algn="r"/>
+            <a:r>
+              <a:rPr lang="en-US">
                 <a:solidFill>
-                  <a:srgbClr val="FFFFFF"/>
+                  <a:srgbClr val="002060"/>
                 </a:solidFill>
-              </a14:hiddenFill>
-            </a:ext>
-          </a:extLst>
-        </p:spPr>
-      </p:pic>
+              </a:rPr>
+              <a:t>(Ritter et al., 2011)</a:t>
+            </a:r>
+          </a:p>
+        </p:txBody>
+      </p:sp>
       <p:pic>
         <p:nvPicPr>
-          <p:cNvPr id="7" name="Picture 6">
+          <p:cNvPr id="11" name="Picture 10">
             <a:extLst>
               <a:ext uri="{FF2B5EF4-FFF2-40B4-BE49-F238E27FC236}">
-                <a16:creationId xmlns:a16="http://schemas.microsoft.com/office/drawing/2014/main" xmlns="" id="{C9D1664F-3E2D-44D1-869B-2D54C62EACC8}"/>
+                <a16:creationId xmlns="" xmlns:a16="http://schemas.microsoft.com/office/drawing/2014/main" id="{139CD10C-D795-43F9-9BE2-0158C5C25AF2}"/>
               </a:ext>
             </a:extLst>
           </p:cNvPr>
@@ -12160,203 +12308,27 @@
           <p:nvPr/>
         </p:nvPicPr>
         <p:blipFill>
-          <a:blip r:embed="rId3"/>
+          <a:blip r:embed="rId2"/>
           <a:stretch>
             <a:fillRect/>
           </a:stretch>
         </p:blipFill>
         <p:spPr>
           <a:xfrm>
-            <a:off x="4005262" y="4565120"/>
-            <a:ext cx="4090226" cy="2130600"/>
+            <a:off x="1523068" y="3761064"/>
+            <a:ext cx="5910665" cy="2030290"/>
           </a:xfrm>
           <a:prstGeom prst="rect">
             <a:avLst/>
           </a:prstGeom>
         </p:spPr>
       </p:pic>
-      <p:pic>
-        <p:nvPicPr>
-          <p:cNvPr id="8" name="Picture 7">
+      <p:sp>
+        <p:nvSpPr>
+          <p:cNvPr id="7" name="Title 1">
             <a:extLst>
               <a:ext uri="{FF2B5EF4-FFF2-40B4-BE49-F238E27FC236}">
-                <a16:creationId xmlns:a16="http://schemas.microsoft.com/office/drawing/2014/main" xmlns="" id="{7DEDEEDD-DFDA-43E7-BDEF-132D6284F67E}"/>
-              </a:ext>
-            </a:extLst>
-          </p:cNvPr>
-          <p:cNvPicPr>
-            <a:picLocks noChangeAspect="1"/>
-          </p:cNvPicPr>
-          <p:nvPr/>
-        </p:nvPicPr>
-        <p:blipFill>
-          <a:blip r:embed="rId4"/>
-          <a:stretch>
-            <a:fillRect/>
-          </a:stretch>
-        </p:blipFill>
-        <p:spPr>
-          <a:xfrm>
-            <a:off x="505968" y="3730017"/>
-            <a:ext cx="3284692" cy="2463519"/>
-          </a:xfrm>
-          <a:prstGeom prst="rect">
-            <a:avLst/>
-          </a:prstGeom>
-        </p:spPr>
-      </p:pic>
-      <p:pic>
-        <p:nvPicPr>
-          <p:cNvPr id="9" name="Picture 8">
-            <a:extLst>
-              <a:ext uri="{FF2B5EF4-FFF2-40B4-BE49-F238E27FC236}">
-                <a16:creationId xmlns:a16="http://schemas.microsoft.com/office/drawing/2014/main" xmlns="" id="{5BF4D1C3-2098-4FA9-9AE9-B6310FFD0382}"/>
-              </a:ext>
-            </a:extLst>
-          </p:cNvPr>
-          <p:cNvPicPr>
-            <a:picLocks noChangeAspect="1"/>
-          </p:cNvPicPr>
-          <p:nvPr/>
-        </p:nvPicPr>
-        <p:blipFill>
-          <a:blip r:embed="rId5"/>
-          <a:stretch>
-            <a:fillRect/>
-          </a:stretch>
-        </p:blipFill>
-        <p:spPr>
-          <a:xfrm>
-            <a:off x="4274112" y="2602471"/>
-            <a:ext cx="1757118" cy="1757118"/>
-          </a:xfrm>
-          <a:prstGeom prst="rect">
-            <a:avLst/>
-          </a:prstGeom>
-        </p:spPr>
-      </p:pic>
-      <p:pic>
-        <p:nvPicPr>
-          <p:cNvPr id="10" name="Picture 9">
-            <a:extLst>
-              <a:ext uri="{FF2B5EF4-FFF2-40B4-BE49-F238E27FC236}">
-                <a16:creationId xmlns:a16="http://schemas.microsoft.com/office/drawing/2014/main" xmlns="" id="{F6D94560-CDCC-433E-9834-5916B450239B}"/>
-              </a:ext>
-            </a:extLst>
-          </p:cNvPr>
-          <p:cNvPicPr>
-            <a:picLocks noChangeAspect="1"/>
-          </p:cNvPicPr>
-          <p:nvPr/>
-        </p:nvPicPr>
-        <p:blipFill>
-          <a:blip r:embed="rId6"/>
-          <a:stretch>
-            <a:fillRect/>
-          </a:stretch>
-        </p:blipFill>
-        <p:spPr>
-          <a:xfrm>
-            <a:off x="6567678" y="3299670"/>
-            <a:ext cx="2442210" cy="1059919"/>
-          </a:xfrm>
-          <a:prstGeom prst="rect">
-            <a:avLst/>
-          </a:prstGeom>
-        </p:spPr>
-      </p:pic>
-      <p:pic>
-        <p:nvPicPr>
-          <p:cNvPr id="11" name="Picture 10">
-            <a:extLst>
-              <a:ext uri="{FF2B5EF4-FFF2-40B4-BE49-F238E27FC236}">
-                <a16:creationId xmlns:a16="http://schemas.microsoft.com/office/drawing/2014/main" xmlns="" id="{CBF3A1EB-BA6B-484A-AA20-176F12D326FF}"/>
-              </a:ext>
-            </a:extLst>
-          </p:cNvPr>
-          <p:cNvPicPr>
-            <a:picLocks noChangeAspect="1"/>
-          </p:cNvPicPr>
-          <p:nvPr/>
-        </p:nvPicPr>
-        <p:blipFill>
-          <a:blip r:embed="rId7"/>
-          <a:stretch>
-            <a:fillRect/>
-          </a:stretch>
-        </p:blipFill>
-        <p:spPr>
-          <a:xfrm>
-            <a:off x="5903770" y="1342696"/>
-            <a:ext cx="3106118" cy="1619960"/>
-          </a:xfrm>
-          <a:prstGeom prst="rect">
-            <a:avLst/>
-          </a:prstGeom>
-        </p:spPr>
-      </p:pic>
-      <p:sp>
-        <p:nvSpPr>
-          <p:cNvPr id="12" name="Rectangle 11">
-            <a:extLst>
-              <a:ext uri="{FF2B5EF4-FFF2-40B4-BE49-F238E27FC236}">
-                <a16:creationId xmlns:a16="http://schemas.microsoft.com/office/drawing/2014/main" xmlns="" id="{30DBC704-3387-4A5D-A8E1-6CA6EEB5ADF6}"/>
-              </a:ext>
-            </a:extLst>
-          </p:cNvPr>
-          <p:cNvSpPr/>
-          <p:nvPr/>
-        </p:nvSpPr>
-        <p:spPr>
-          <a:xfrm>
-            <a:off x="182880" y="1450849"/>
-            <a:ext cx="8827008" cy="5035296"/>
-          </a:xfrm>
-          <a:prstGeom prst="rect">
-            <a:avLst/>
-          </a:prstGeom>
-          <a:solidFill>
-            <a:schemeClr val="accent6">
-              <a:lumMod val="40000"/>
-              <a:lumOff val="60000"/>
-              <a:alpha val="93000"/>
-            </a:schemeClr>
-          </a:solidFill>
-          <a:ln>
-            <a:noFill/>
-          </a:ln>
-        </p:spPr>
-        <p:style>
-          <a:lnRef idx="2">
-            <a:schemeClr val="accent1">
-              <a:shade val="50000"/>
-            </a:schemeClr>
-          </a:lnRef>
-          <a:fillRef idx="1">
-            <a:schemeClr val="accent1"/>
-          </a:fillRef>
-          <a:effectRef idx="0">
-            <a:schemeClr val="accent1"/>
-          </a:effectRef>
-          <a:fontRef idx="minor">
-            <a:schemeClr val="lt1"/>
-          </a:fontRef>
-        </p:style>
-        <p:txBody>
-          <a:bodyPr rtlCol="0" anchor="ctr"/>
-          <a:lstStyle/>
-          <a:p>
-            <a:pPr algn="ctr"/>
-            <a:endParaRPr lang="en-US"/>
-          </a:p>
-        </p:txBody>
-      </p:sp>
-      <p:sp>
-        <p:nvSpPr>
-          <p:cNvPr id="13" name="Title 1">
-            <a:extLst>
-              <a:ext uri="{FF2B5EF4-FFF2-40B4-BE49-F238E27FC236}">
-                <a16:creationId xmlns:a16="http://schemas.microsoft.com/office/drawing/2014/main" xmlns="" id="{95A38355-5A7F-4B61-8049-EB7D4C4B3DC5}"/>
+                <a16:creationId xmlns="" xmlns:a16="http://schemas.microsoft.com/office/drawing/2014/main" id="{D6B083CC-4209-47D3-8AFB-A755190E41BB}"/>
               </a:ext>
             </a:extLst>
           </p:cNvPr>
@@ -12367,8 +12339,8 @@
         </p:nvSpPr>
         <p:spPr>
           <a:xfrm>
-            <a:off x="1914144" y="3281046"/>
-            <a:ext cx="5669280" cy="2387600"/>
+            <a:off x="781050" y="517526"/>
+            <a:ext cx="7886700" cy="1325563"/>
           </a:xfrm>
           <a:prstGeom prst="rect">
             <a:avLst/>
@@ -12399,25 +12371,16 @@
           </a:lstStyle>
           <a:p>
             <a:r>
-              <a:rPr lang="en-US" b="1">
-                <a:solidFill>
-                  <a:srgbClr val="002060"/>
-                </a:solidFill>
-              </a:rPr>
-              <a:t>Demonstration of SpaCy</a:t>
-            </a:r>
-            <a:endParaRPr lang="en-US" b="1" dirty="0">
-              <a:solidFill>
-                <a:srgbClr val="002060"/>
-              </a:solidFill>
-            </a:endParaRPr>
+              <a:rPr lang="en-US" sz="4000"/>
+              <a:t>Are Off-the-shelf Tools Good Enough?</a:t>
+            </a:r>
           </a:p>
         </p:txBody>
       </p:sp>
     </p:spTree>
     <p:extLst>
       <p:ext uri="{BB962C8B-B14F-4D97-AF65-F5344CB8AC3E}">
-        <p14:creationId xmlns:p14="http://schemas.microsoft.com/office/powerpoint/2010/main" val="454712633"/>
+        <p14:creationId xmlns:p14="http://schemas.microsoft.com/office/powerpoint/2010/main" val="1753429276"/>
       </p:ext>
     </p:extLst>
   </p:cSld>
@@ -12456,7 +12419,7 @@
           <p:cNvPr id="2" name="Title 1">
             <a:extLst>
               <a:ext uri="{FF2B5EF4-FFF2-40B4-BE49-F238E27FC236}">
-                <a16:creationId xmlns:a16="http://schemas.microsoft.com/office/drawing/2014/main" xmlns="" id="{98EED3C8-49EA-4FD6-AA72-3757D4559438}"/>
+                <a16:creationId xmlns="" xmlns:a16="http://schemas.microsoft.com/office/drawing/2014/main" id="{D6B083CC-4209-47D3-8AFB-A755190E41BB}"/>
               </a:ext>
             </a:extLst>
           </p:cNvPr>
@@ -12469,22 +12432,24 @@
         </p:nvSpPr>
         <p:spPr/>
         <p:txBody>
-          <a:bodyPr/>
-          <a:lstStyle/>
-          <a:p>
-            <a:r>
-              <a:rPr lang="en-US"/>
-              <a:t>Twitter-specific NER Systems</a:t>
-            </a:r>
-          </a:p>
-        </p:txBody>
-      </p:sp>
-      <p:sp>
-        <p:nvSpPr>
-          <p:cNvPr id="3" name="Content Placeholder 2">
+          <a:bodyPr>
+            <a:normAutofit/>
+          </a:bodyPr>
+          <a:lstStyle/>
+          <a:p>
+            <a:r>
+              <a:rPr lang="en-US" sz="4000"/>
+              <a:t>Are Off-the-shelf Tools Good Enough?</a:t>
+            </a:r>
+          </a:p>
+        </p:txBody>
+      </p:sp>
+      <p:sp>
+        <p:nvSpPr>
+          <p:cNvPr id="9" name="Content Placeholder 8">
             <a:extLst>
               <a:ext uri="{FF2B5EF4-FFF2-40B4-BE49-F238E27FC236}">
-                <a16:creationId xmlns:a16="http://schemas.microsoft.com/office/drawing/2014/main" xmlns="" id="{CAB91084-3E46-400D-BE22-90BD771E168C}"/>
+                <a16:creationId xmlns="" xmlns:a16="http://schemas.microsoft.com/office/drawing/2014/main" id="{B1ED2A46-1714-4043-8859-0515A435A3E5}"/>
               </a:ext>
             </a:extLst>
           </p:cNvPr>
@@ -12497,6 +12462,366 @@
         </p:nvSpPr>
         <p:spPr>
           <a:xfrm>
+            <a:off x="609600" y="1825625"/>
+            <a:ext cx="7886700" cy="4351338"/>
+          </a:xfrm>
+        </p:spPr>
+        <p:txBody>
+          <a:bodyPr/>
+          <a:lstStyle/>
+          <a:p>
+            <a:r>
+              <a:rPr lang="en-US"/>
+              <a:t>Example: Stanford NER (off-the-shelf) vs. T-SEG (a Twitter-specific NER tool)</a:t>
+            </a:r>
+          </a:p>
+          <a:p>
+            <a:r>
+              <a:rPr lang="en-US"/>
+              <a:t>P, R and F1 below stand for Precision, Recall and F1-Measure resp. </a:t>
+            </a:r>
+          </a:p>
+        </p:txBody>
+      </p:sp>
+      <p:pic>
+        <p:nvPicPr>
+          <p:cNvPr id="11" name="Picture 10">
+            <a:extLst>
+              <a:ext uri="{FF2B5EF4-FFF2-40B4-BE49-F238E27FC236}">
+                <a16:creationId xmlns="" xmlns:a16="http://schemas.microsoft.com/office/drawing/2014/main" id="{139CD10C-D795-43F9-9BE2-0158C5C25AF2}"/>
+              </a:ext>
+            </a:extLst>
+          </p:cNvPr>
+          <p:cNvPicPr>
+            <a:picLocks noChangeAspect="1"/>
+          </p:cNvPicPr>
+          <p:nvPr/>
+        </p:nvPicPr>
+        <p:blipFill>
+          <a:blip r:embed="rId3"/>
+          <a:stretch>
+            <a:fillRect/>
+          </a:stretch>
+        </p:blipFill>
+        <p:spPr>
+          <a:xfrm>
+            <a:off x="1006602" y="3473196"/>
+            <a:ext cx="7090456" cy="2435543"/>
+          </a:xfrm>
+          <a:prstGeom prst="rect">
+            <a:avLst/>
+          </a:prstGeom>
+        </p:spPr>
+      </p:pic>
+      <p:sp>
+        <p:nvSpPr>
+          <p:cNvPr id="8" name="Rectangle 7">
+            <a:extLst>
+              <a:ext uri="{FF2B5EF4-FFF2-40B4-BE49-F238E27FC236}">
+                <a16:creationId xmlns="" xmlns:a16="http://schemas.microsoft.com/office/drawing/2014/main" id="{99016647-0CBA-4CDC-A66E-8FCBED8E4481}"/>
+              </a:ext>
+            </a:extLst>
+          </p:cNvPr>
+          <p:cNvSpPr/>
+          <p:nvPr/>
+        </p:nvSpPr>
+        <p:spPr>
+          <a:xfrm>
+            <a:off x="304800" y="1690689"/>
+            <a:ext cx="8595360" cy="1930335"/>
+          </a:xfrm>
+          <a:prstGeom prst="rect">
+            <a:avLst/>
+          </a:prstGeom>
+          <a:solidFill>
+            <a:schemeClr val="accent6">
+              <a:lumMod val="40000"/>
+              <a:lumOff val="60000"/>
+              <a:alpha val="93000"/>
+            </a:schemeClr>
+          </a:solidFill>
+          <a:ln>
+            <a:noFill/>
+          </a:ln>
+        </p:spPr>
+        <p:style>
+          <a:lnRef idx="2">
+            <a:schemeClr val="accent1">
+              <a:shade val="50000"/>
+            </a:schemeClr>
+          </a:lnRef>
+          <a:fillRef idx="1">
+            <a:schemeClr val="accent1"/>
+          </a:fillRef>
+          <a:effectRef idx="0">
+            <a:schemeClr val="accent1"/>
+          </a:effectRef>
+          <a:fontRef idx="minor">
+            <a:schemeClr val="lt1"/>
+          </a:fontRef>
+        </p:style>
+        <p:txBody>
+          <a:bodyPr rtlCol="0" anchor="ctr"/>
+          <a:lstStyle/>
+          <a:p>
+            <a:pPr algn="ctr"/>
+            <a:endParaRPr lang="en-US"/>
+          </a:p>
+        </p:txBody>
+      </p:sp>
+      <p:sp>
+        <p:nvSpPr>
+          <p:cNvPr id="4" name="TextBox 3">
+            <a:extLst>
+              <a:ext uri="{FF2B5EF4-FFF2-40B4-BE49-F238E27FC236}">
+                <a16:creationId xmlns="" xmlns:a16="http://schemas.microsoft.com/office/drawing/2014/main" id="{4B33F1C3-6003-4D94-915E-6A63B46DBE1C}"/>
+              </a:ext>
+            </a:extLst>
+          </p:cNvPr>
+          <p:cNvSpPr txBox="1"/>
+          <p:nvPr/>
+        </p:nvSpPr>
+        <p:spPr>
+          <a:xfrm>
+            <a:off x="900685" y="2042602"/>
+            <a:ext cx="7595615" cy="1569660"/>
+          </a:xfrm>
+          <a:prstGeom prst="rect">
+            <a:avLst/>
+          </a:prstGeom>
+          <a:noFill/>
+        </p:spPr>
+        <p:txBody>
+          <a:bodyPr wrap="square" rtlCol="0">
+            <a:spAutoFit/>
+          </a:bodyPr>
+          <a:lstStyle/>
+          <a:p>
+            <a:pPr algn="ctr"/>
+            <a:r>
+              <a:rPr lang="en-US" sz="3200"/>
+              <a:t>Training Twitter-specific models and using Twitter-specific features offers significant performance advantages</a:t>
+            </a:r>
+          </a:p>
+        </p:txBody>
+      </p:sp>
+      <p:sp>
+        <p:nvSpPr>
+          <p:cNvPr id="3" name="Oval 2">
+            <a:extLst>
+              <a:ext uri="{FF2B5EF4-FFF2-40B4-BE49-F238E27FC236}">
+                <a16:creationId xmlns="" xmlns:a16="http://schemas.microsoft.com/office/drawing/2014/main" id="{A6AA111D-A7A9-4A20-AA18-6ABD3344B561}"/>
+              </a:ext>
+            </a:extLst>
+          </p:cNvPr>
+          <p:cNvSpPr/>
+          <p:nvPr/>
+        </p:nvSpPr>
+        <p:spPr>
+          <a:xfrm>
+            <a:off x="6693408" y="3473196"/>
+            <a:ext cx="1281730" cy="2574036"/>
+          </a:xfrm>
+          <a:prstGeom prst="ellipse">
+            <a:avLst/>
+          </a:prstGeom>
+          <a:noFill/>
+          <a:ln w="38100">
+            <a:solidFill>
+              <a:srgbClr val="FF0000"/>
+            </a:solidFill>
+          </a:ln>
+        </p:spPr>
+        <p:style>
+          <a:lnRef idx="2">
+            <a:schemeClr val="accent1">
+              <a:shade val="50000"/>
+            </a:schemeClr>
+          </a:lnRef>
+          <a:fillRef idx="1">
+            <a:schemeClr val="accent1"/>
+          </a:fillRef>
+          <a:effectRef idx="0">
+            <a:schemeClr val="accent1"/>
+          </a:effectRef>
+          <a:fontRef idx="minor">
+            <a:schemeClr val="lt1"/>
+          </a:fontRef>
+        </p:style>
+        <p:txBody>
+          <a:bodyPr rtlCol="0" anchor="ctr"/>
+          <a:lstStyle/>
+          <a:p>
+            <a:pPr algn="ctr"/>
+            <a:endParaRPr lang="en-US"/>
+          </a:p>
+        </p:txBody>
+      </p:sp>
+      <p:cxnSp>
+        <p:nvCxnSpPr>
+          <p:cNvPr id="6" name="Straight Arrow Connector 5">
+            <a:extLst>
+              <a:ext uri="{FF2B5EF4-FFF2-40B4-BE49-F238E27FC236}">
+                <a16:creationId xmlns="" xmlns:a16="http://schemas.microsoft.com/office/drawing/2014/main" id="{61BDA680-BA2B-49A7-BB1B-55390EF54BAA}"/>
+              </a:ext>
+            </a:extLst>
+          </p:cNvPr>
+          <p:cNvCxnSpPr/>
+          <p:nvPr/>
+        </p:nvCxnSpPr>
+        <p:spPr>
+          <a:xfrm>
+            <a:off x="4645152" y="3473196"/>
+            <a:ext cx="2170176" cy="428244"/>
+          </a:xfrm>
+          <a:prstGeom prst="straightConnector1">
+            <a:avLst/>
+          </a:prstGeom>
+          <a:ln>
+            <a:solidFill>
+              <a:srgbClr val="FF0000"/>
+            </a:solidFill>
+            <a:tailEnd type="triangle"/>
+          </a:ln>
+        </p:spPr>
+        <p:style>
+          <a:lnRef idx="1">
+            <a:schemeClr val="accent1"/>
+          </a:lnRef>
+          <a:fillRef idx="0">
+            <a:schemeClr val="accent1"/>
+          </a:fillRef>
+          <a:effectRef idx="0">
+            <a:schemeClr val="accent1"/>
+          </a:effectRef>
+          <a:fontRef idx="minor">
+            <a:schemeClr val="tx1"/>
+          </a:fontRef>
+        </p:style>
+      </p:cxnSp>
+      <p:sp>
+        <p:nvSpPr>
+          <p:cNvPr id="12" name="TextBox 11">
+            <a:extLst>
+              <a:ext uri="{FF2B5EF4-FFF2-40B4-BE49-F238E27FC236}">
+                <a16:creationId xmlns="" xmlns:a16="http://schemas.microsoft.com/office/drawing/2014/main" id="{A9662CE1-4096-4132-B041-42E280DDC82E}"/>
+              </a:ext>
+            </a:extLst>
+          </p:cNvPr>
+          <p:cNvSpPr txBox="1"/>
+          <p:nvPr/>
+        </p:nvSpPr>
+        <p:spPr>
+          <a:xfrm>
+            <a:off x="6400800" y="6361629"/>
+            <a:ext cx="2668524" cy="369332"/>
+          </a:xfrm>
+          <a:prstGeom prst="rect">
+            <a:avLst/>
+          </a:prstGeom>
+          <a:noFill/>
+        </p:spPr>
+        <p:txBody>
+          <a:bodyPr wrap="square" rtlCol="0">
+            <a:spAutoFit/>
+          </a:bodyPr>
+          <a:lstStyle/>
+          <a:p>
+            <a:pPr algn="r"/>
+            <a:r>
+              <a:rPr lang="en-US">
+                <a:solidFill>
+                  <a:srgbClr val="002060"/>
+                </a:solidFill>
+              </a:rPr>
+              <a:t>(Ritter et al., 2011)</a:t>
+            </a:r>
+          </a:p>
+        </p:txBody>
+      </p:sp>
+    </p:spTree>
+    <p:extLst>
+      <p:ext uri="{BB962C8B-B14F-4D97-AF65-F5344CB8AC3E}">
+        <p14:creationId xmlns:p14="http://schemas.microsoft.com/office/powerpoint/2010/main" val="155772102"/>
+      </p:ext>
+    </p:extLst>
+  </p:cSld>
+  <p:clrMapOvr>
+    <a:masterClrMapping/>
+  </p:clrMapOvr>
+  <p:timing>
+    <p:tnLst>
+      <p:par>
+        <p:cTn id="1" dur="indefinite" restart="never" nodeType="tmRoot"/>
+      </p:par>
+    </p:tnLst>
+  </p:timing>
+</p:sld>
+</file>
+
+<file path=ppt/slides/slide26.xml><?xml version="1.0" encoding="utf-8"?>
+<p:sld xmlns:a="http://schemas.openxmlformats.org/drawingml/2006/main" xmlns:r="http://schemas.openxmlformats.org/officeDocument/2006/relationships" xmlns:p="http://schemas.openxmlformats.org/presentationml/2006/main">
+  <p:cSld>
+    <p:spTree>
+      <p:nvGrpSpPr>
+        <p:cNvPr id="1" name=""/>
+        <p:cNvGrpSpPr/>
+        <p:nvPr/>
+      </p:nvGrpSpPr>
+      <p:grpSpPr>
+        <a:xfrm>
+          <a:off x="0" y="0"/>
+          <a:ext cx="0" cy="0"/>
+          <a:chOff x="0" y="0"/>
+          <a:chExt cx="0" cy="0"/>
+        </a:xfrm>
+      </p:grpSpPr>
+      <p:sp>
+        <p:nvSpPr>
+          <p:cNvPr id="2" name="Title 1">
+            <a:extLst>
+              <a:ext uri="{FF2B5EF4-FFF2-40B4-BE49-F238E27FC236}">
+                <a16:creationId xmlns="" xmlns:a16="http://schemas.microsoft.com/office/drawing/2014/main" id="{98EED3C8-49EA-4FD6-AA72-3757D4559438}"/>
+              </a:ext>
+            </a:extLst>
+          </p:cNvPr>
+          <p:cNvSpPr>
+            <a:spLocks noGrp="1"/>
+          </p:cNvSpPr>
+          <p:nvPr>
+            <p:ph type="title"/>
+          </p:nvPr>
+        </p:nvSpPr>
+        <p:spPr/>
+        <p:txBody>
+          <a:bodyPr/>
+          <a:lstStyle/>
+          <a:p>
+            <a:r>
+              <a:rPr lang="en-US"/>
+              <a:t>Twitter-specific NER Systems</a:t>
+            </a:r>
+          </a:p>
+        </p:txBody>
+      </p:sp>
+      <p:sp>
+        <p:nvSpPr>
+          <p:cNvPr id="3" name="Content Placeholder 2">
+            <a:extLst>
+              <a:ext uri="{FF2B5EF4-FFF2-40B4-BE49-F238E27FC236}">
+                <a16:creationId xmlns="" xmlns:a16="http://schemas.microsoft.com/office/drawing/2014/main" id="{CAB91084-3E46-400D-BE22-90BD771E168C}"/>
+              </a:ext>
+            </a:extLst>
+          </p:cNvPr>
+          <p:cNvSpPr>
+            <a:spLocks noGrp="1"/>
+          </p:cNvSpPr>
+          <p:nvPr>
+            <p:ph idx="1"/>
+          </p:nvPr>
+        </p:nvSpPr>
+        <p:spPr>
+          <a:xfrm>
             <a:off x="177546" y="2313304"/>
             <a:ext cx="4065270" cy="4351338"/>
           </a:xfrm>
@@ -12537,7 +12862,7 @@
           <p:cNvPr id="5" name="Content Placeholder 2">
             <a:extLst>
               <a:ext uri="{FF2B5EF4-FFF2-40B4-BE49-F238E27FC236}">
-                <a16:creationId xmlns:a16="http://schemas.microsoft.com/office/drawing/2014/main" xmlns="" id="{C4304FCA-E1F7-4952-AD14-0BCA8C5AD477}"/>
+                <a16:creationId xmlns="" xmlns:a16="http://schemas.microsoft.com/office/drawing/2014/main" id="{C4304FCA-E1F7-4952-AD14-0BCA8C5AD477}"/>
               </a:ext>
             </a:extLst>
           </p:cNvPr>
@@ -12751,7 +13076,7 @@
           <p:cNvPr id="6" name="TextBox 5">
             <a:extLst>
               <a:ext uri="{FF2B5EF4-FFF2-40B4-BE49-F238E27FC236}">
-                <a16:creationId xmlns:a16="http://schemas.microsoft.com/office/drawing/2014/main" xmlns="" id="{AC508DBB-8D56-4255-A54A-976A80CEAE97}"/>
+                <a16:creationId xmlns="" xmlns:a16="http://schemas.microsoft.com/office/drawing/2014/main" id="{AC508DBB-8D56-4255-A54A-976A80CEAE97}"/>
               </a:ext>
             </a:extLst>
           </p:cNvPr>
@@ -12790,7 +13115,7 @@
           <p:cNvPr id="7" name="TextBox 6">
             <a:extLst>
               <a:ext uri="{FF2B5EF4-FFF2-40B4-BE49-F238E27FC236}">
-                <a16:creationId xmlns:a16="http://schemas.microsoft.com/office/drawing/2014/main" xmlns="" id="{0DD8D7F7-ADAC-4080-A271-18B84408AA8B}"/>
+                <a16:creationId xmlns="" xmlns:a16="http://schemas.microsoft.com/office/drawing/2014/main" id="{0DD8D7F7-ADAC-4080-A271-18B84408AA8B}"/>
               </a:ext>
             </a:extLst>
           </p:cNvPr>
@@ -12828,192 +13153,6 @@
     <p:extLst>
       <p:ext uri="{BB962C8B-B14F-4D97-AF65-F5344CB8AC3E}">
         <p14:creationId xmlns:p14="http://schemas.microsoft.com/office/powerpoint/2010/main" val="1866214922"/>
-      </p:ext>
-    </p:extLst>
-  </p:cSld>
-  <p:clrMapOvr>
-    <a:masterClrMapping/>
-  </p:clrMapOvr>
-  <p:timing>
-    <p:tnLst>
-      <p:par>
-        <p:cTn id="1" dur="indefinite" restart="never" nodeType="tmRoot"/>
-      </p:par>
-    </p:tnLst>
-  </p:timing>
-</p:sld>
-</file>
-
-<file path=ppt/slides/slide26.xml><?xml version="1.0" encoding="utf-8"?>
-<p:sld xmlns:a="http://schemas.openxmlformats.org/drawingml/2006/main" xmlns:r="http://schemas.openxmlformats.org/officeDocument/2006/relationships" xmlns:p="http://schemas.openxmlformats.org/presentationml/2006/main">
-  <p:cSld>
-    <p:spTree>
-      <p:nvGrpSpPr>
-        <p:cNvPr id="1" name=""/>
-        <p:cNvGrpSpPr/>
-        <p:nvPr/>
-      </p:nvGrpSpPr>
-      <p:grpSpPr>
-        <a:xfrm>
-          <a:off x="0" y="0"/>
-          <a:ext cx="0" cy="0"/>
-          <a:chOff x="0" y="0"/>
-          <a:chExt cx="0" cy="0"/>
-        </a:xfrm>
-      </p:grpSpPr>
-      <p:sp>
-        <p:nvSpPr>
-          <p:cNvPr id="2" name="Title 1">
-            <a:extLst>
-              <a:ext uri="{FF2B5EF4-FFF2-40B4-BE49-F238E27FC236}">
-                <a16:creationId xmlns:a16="http://schemas.microsoft.com/office/drawing/2014/main" xmlns="" id="{6EA66CEF-80A3-4CFD-A9BB-1C66D281398B}"/>
-              </a:ext>
-            </a:extLst>
-          </p:cNvPr>
-          <p:cNvSpPr>
-            <a:spLocks noGrp="1"/>
-          </p:cNvSpPr>
-          <p:nvPr>
-            <p:ph type="title"/>
-          </p:nvPr>
-        </p:nvSpPr>
-        <p:spPr/>
-        <p:txBody>
-          <a:bodyPr/>
-          <a:lstStyle/>
-          <a:p>
-            <a:r>
-              <a:rPr lang="en-US"/>
-              <a:t>Classic System: T-SEG</a:t>
-            </a:r>
-          </a:p>
-        </p:txBody>
-      </p:sp>
-      <p:sp>
-        <p:nvSpPr>
-          <p:cNvPr id="3" name="Content Placeholder 2">
-            <a:extLst>
-              <a:ext uri="{FF2B5EF4-FFF2-40B4-BE49-F238E27FC236}">
-                <a16:creationId xmlns:a16="http://schemas.microsoft.com/office/drawing/2014/main" xmlns="" id="{BB485482-83E4-4D7B-BC28-ED9C8462CEA9}"/>
-              </a:ext>
-            </a:extLst>
-          </p:cNvPr>
-          <p:cNvSpPr>
-            <a:spLocks noGrp="1"/>
-          </p:cNvSpPr>
-          <p:nvPr>
-            <p:ph idx="1"/>
-          </p:nvPr>
-        </p:nvSpPr>
-        <p:spPr>
-          <a:xfrm>
-            <a:off x="268224" y="1825624"/>
-            <a:ext cx="8825484" cy="4721479"/>
-          </a:xfrm>
-        </p:spPr>
-        <p:txBody>
-          <a:bodyPr>
-            <a:normAutofit fontScale="92500" lnSpcReduction="10000"/>
-          </a:bodyPr>
-          <a:lstStyle/>
-          <a:p>
-            <a:r>
-              <a:rPr lang="en-US"/>
-              <a:t>First system to (arguably) show that Twitter-specific NER far outperforms off-the-shelf state-of-the-art NERs </a:t>
-            </a:r>
-          </a:p>
-          <a:p>
-            <a:r>
-              <a:rPr lang="en-US"/>
-              <a:t>Standard features (e.g., POS tags), with some optimized for Twitter</a:t>
-            </a:r>
-          </a:p>
-          <a:p>
-            <a:pPr lvl="1"/>
-            <a:r>
-              <a:rPr lang="en-US"/>
-              <a:t>Twitter-specific features include new tags for hashtags, retweets etc.</a:t>
-            </a:r>
-          </a:p>
-          <a:p>
-            <a:pPr lvl="1"/>
-            <a:r>
-              <a:rPr lang="en-US"/>
-              <a:t>Showed results earlier</a:t>
-            </a:r>
-          </a:p>
-          <a:p>
-            <a:r>
-              <a:rPr lang="en-US"/>
-              <a:t>In-domain training data (i.e. actual tweets)</a:t>
-            </a:r>
-          </a:p>
-          <a:p>
-            <a:pPr lvl="1"/>
-            <a:r>
-              <a:rPr lang="en-US"/>
-              <a:t>Also used IRC chat data to supplement small training data</a:t>
-            </a:r>
-          </a:p>
-          <a:p>
-            <a:r>
-              <a:rPr lang="en-US"/>
-              <a:t>Used distributional similarity to account for spelling variations, predated similar ‘word embedding’ techniques like fastText by many years (conceptually)!</a:t>
-            </a:r>
-          </a:p>
-          <a:p>
-            <a:pPr lvl="1"/>
-            <a:r>
-              <a:rPr lang="en-US"/>
-              <a:t>Clusters words like ‘tomarrow’, ‘tomm’, ‘tommarow’, ‘tommarrow’</a:t>
-            </a:r>
-          </a:p>
-        </p:txBody>
-      </p:sp>
-      <p:sp>
-        <p:nvSpPr>
-          <p:cNvPr id="5" name="TextBox 4">
-            <a:extLst>
-              <a:ext uri="{FF2B5EF4-FFF2-40B4-BE49-F238E27FC236}">
-                <a16:creationId xmlns:a16="http://schemas.microsoft.com/office/drawing/2014/main" xmlns="" id="{6170541E-0039-47AC-8A76-8ED40D7DA676}"/>
-              </a:ext>
-            </a:extLst>
-          </p:cNvPr>
-          <p:cNvSpPr txBox="1"/>
-          <p:nvPr/>
-        </p:nvSpPr>
-        <p:spPr>
-          <a:xfrm>
-            <a:off x="6425184" y="6370249"/>
-            <a:ext cx="2668524" cy="369332"/>
-          </a:xfrm>
-          <a:prstGeom prst="rect">
-            <a:avLst/>
-          </a:prstGeom>
-          <a:noFill/>
-        </p:spPr>
-        <p:txBody>
-          <a:bodyPr wrap="square" rtlCol="0">
-            <a:spAutoFit/>
-          </a:bodyPr>
-          <a:lstStyle/>
-          <a:p>
-            <a:pPr algn="r"/>
-            <a:r>
-              <a:rPr lang="en-US">
-                <a:solidFill>
-                  <a:srgbClr val="002060"/>
-                </a:solidFill>
-              </a:rPr>
-              <a:t>(Ritter et al., 2011)</a:t>
-            </a:r>
-          </a:p>
-        </p:txBody>
-      </p:sp>
-    </p:spTree>
-    <p:extLst>
-      <p:ext uri="{BB962C8B-B14F-4D97-AF65-F5344CB8AC3E}">
-        <p14:creationId xmlns:p14="http://schemas.microsoft.com/office/powerpoint/2010/main" val="1010299184"/>
       </p:ext>
     </p:extLst>
   </p:cSld>
@@ -13052,7 +13191,7 @@
           <p:cNvPr id="2" name="Title 1">
             <a:extLst>
               <a:ext uri="{FF2B5EF4-FFF2-40B4-BE49-F238E27FC236}">
-                <a16:creationId xmlns:a16="http://schemas.microsoft.com/office/drawing/2014/main" xmlns="" id="{6EA66CEF-80A3-4CFD-A9BB-1C66D281398B}"/>
+                <a16:creationId xmlns="" xmlns:a16="http://schemas.microsoft.com/office/drawing/2014/main" id="{6EA66CEF-80A3-4CFD-A9BB-1C66D281398B}"/>
               </a:ext>
             </a:extLst>
           </p:cNvPr>
@@ -13070,7 +13209,7 @@
           <a:p>
             <a:r>
               <a:rPr lang="en-US"/>
-              <a:t>More Recent: TwitterNER</a:t>
+              <a:t>Classic System: T-SEG</a:t>
             </a:r>
           </a:p>
         </p:txBody>
@@ -13080,7 +13219,7 @@
           <p:cNvPr id="3" name="Content Placeholder 2">
             <a:extLst>
               <a:ext uri="{FF2B5EF4-FFF2-40B4-BE49-F238E27FC236}">
-                <a16:creationId xmlns:a16="http://schemas.microsoft.com/office/drawing/2014/main" xmlns="" id="{BB485482-83E4-4D7B-BC28-ED9C8462CEA9}"/>
+                <a16:creationId xmlns="" xmlns:a16="http://schemas.microsoft.com/office/drawing/2014/main" id="{BB485482-83E4-4D7B-BC28-ED9C8462CEA9}"/>
               </a:ext>
             </a:extLst>
           </p:cNvPr>
@@ -13091,12 +13230,83 @@
             <p:ph idx="1"/>
           </p:nvPr>
         </p:nvSpPr>
-        <p:spPr/>
-        <p:txBody>
-          <a:bodyPr/>
-          <a:lstStyle/>
-          <a:p>
-            <a:endParaRPr lang="en-US"/>
+        <p:spPr>
+          <a:xfrm>
+            <a:off x="268224" y="1825624"/>
+            <a:ext cx="8825484" cy="4721479"/>
+          </a:xfrm>
+        </p:spPr>
+        <p:txBody>
+          <a:bodyPr>
+            <a:normAutofit fontScale="92500" lnSpcReduction="10000"/>
+          </a:bodyPr>
+          <a:lstStyle/>
+          <a:p>
+            <a:r>
+              <a:rPr lang="en-US"/>
+              <a:t>First system to (arguably) show that Twitter-specific NER far outperforms off-the-shelf state-of-the-art NERs </a:t>
+            </a:r>
+          </a:p>
+          <a:p>
+            <a:r>
+              <a:rPr lang="en-US"/>
+              <a:t>Standard features e.g., POS tags, with some optimized for Twitter</a:t>
+            </a:r>
+          </a:p>
+          <a:p>
+            <a:pPr lvl="1"/>
+            <a:r>
+              <a:rPr lang="en-US"/>
+              <a:t>Twitter-specific features include new tags for hashtags, retweets etc.</a:t>
+            </a:r>
+          </a:p>
+          <a:p>
+            <a:pPr lvl="1"/>
+            <a:r>
+              <a:rPr lang="en-US"/>
+              <a:t>Showed results earlier</a:t>
+            </a:r>
+          </a:p>
+          <a:p>
+            <a:r>
+              <a:rPr lang="en-US"/>
+              <a:t>In-domain training data i.e. </a:t>
+            </a:r>
+            <a:r>
+              <a:rPr lang="en-US" i="1"/>
+              <a:t>actual tweets</a:t>
+            </a:r>
+          </a:p>
+          <a:p>
+            <a:pPr lvl="1"/>
+            <a:r>
+              <a:rPr lang="en-US"/>
+              <a:t>Also used IRC chat data to supplement small training data</a:t>
+            </a:r>
+          </a:p>
+          <a:p>
+            <a:r>
+              <a:rPr lang="en-US"/>
+              <a:t>Used distributional similarity to account for spelling variations, </a:t>
+            </a:r>
+          </a:p>
+          <a:p>
+            <a:pPr lvl="1"/>
+            <a:r>
+              <a:rPr lang="en-US"/>
+              <a:t>P</a:t>
+            </a:r>
+            <a:r>
+              <a:rPr lang="en-US"/>
+              <a:t>redated similar ‘word embedding’ techniques like fastText by many years (conceptually)!</a:t>
+            </a:r>
+          </a:p>
+          <a:p>
+            <a:pPr lvl="1"/>
+            <a:r>
+              <a:rPr lang="en-US"/>
+              <a:t>Clusters words like ‘tomarrow’, ‘tomm’, ‘tommarow’, ‘tommarrow’</a:t>
+            </a:r>
           </a:p>
         </p:txBody>
       </p:sp>
@@ -13105,7 +13315,7 @@
           <p:cNvPr id="5" name="TextBox 4">
             <a:extLst>
               <a:ext uri="{FF2B5EF4-FFF2-40B4-BE49-F238E27FC236}">
-                <a16:creationId xmlns:a16="http://schemas.microsoft.com/office/drawing/2014/main" xmlns="" id="{D6BBBBCF-B341-4F96-8E03-7D7F78D47761}"/>
+                <a16:creationId xmlns="" xmlns:a16="http://schemas.microsoft.com/office/drawing/2014/main" id="{6170541E-0039-47AC-8A76-8ED40D7DA676}"/>
               </a:ext>
             </a:extLst>
           </p:cNvPr>
@@ -13114,8 +13324,8 @@
         </p:nvSpPr>
         <p:spPr>
           <a:xfrm>
-            <a:off x="6132576" y="6370249"/>
-            <a:ext cx="2961132" cy="369332"/>
+            <a:off x="6425184" y="6468882"/>
+            <a:ext cx="2668524" cy="307777"/>
           </a:xfrm>
           <a:prstGeom prst="rect">
             <a:avLst/>
@@ -13130,50 +13340,20 @@
           <a:p>
             <a:pPr algn="r"/>
             <a:r>
-              <a:rPr lang="en-US">
+              <a:rPr lang="en-US" sz="1400">
                 <a:solidFill>
                   <a:srgbClr val="002060"/>
                 </a:solidFill>
               </a:rPr>
-              <a:t>(Mishra and Diesner, 2013)</a:t>
-            </a:r>
-          </a:p>
-        </p:txBody>
-      </p:sp>
-      <p:pic>
-        <p:nvPicPr>
-          <p:cNvPr id="6" name="Picture 5">
-            <a:extLst>
-              <a:ext uri="{FF2B5EF4-FFF2-40B4-BE49-F238E27FC236}">
-                <a16:creationId xmlns:a16="http://schemas.microsoft.com/office/drawing/2014/main" xmlns="" id="{B2C808EF-D515-4A45-9CCD-07E40B1F20D9}"/>
-              </a:ext>
-            </a:extLst>
-          </p:cNvPr>
-          <p:cNvPicPr>
-            <a:picLocks noChangeAspect="1"/>
-          </p:cNvPicPr>
-          <p:nvPr/>
-        </p:nvPicPr>
-        <p:blipFill>
-          <a:blip r:embed="rId3"/>
-          <a:stretch>
-            <a:fillRect/>
-          </a:stretch>
-        </p:blipFill>
-        <p:spPr>
-          <a:xfrm>
-            <a:off x="304800" y="1588770"/>
-            <a:ext cx="8327136" cy="4684014"/>
-          </a:xfrm>
-          <a:prstGeom prst="rect">
-            <a:avLst/>
-          </a:prstGeom>
-        </p:spPr>
-      </p:pic>
+              <a:t>(Ritter et al., 2011)</a:t>
+            </a:r>
+          </a:p>
+        </p:txBody>
+      </p:sp>
     </p:spTree>
     <p:extLst>
       <p:ext uri="{BB962C8B-B14F-4D97-AF65-F5344CB8AC3E}">
-        <p14:creationId xmlns:p14="http://schemas.microsoft.com/office/powerpoint/2010/main" val="3725798188"/>
+        <p14:creationId xmlns:p14="http://schemas.microsoft.com/office/powerpoint/2010/main" val="1010299184"/>
       </p:ext>
     </p:extLst>
   </p:cSld>
@@ -13212,7 +13392,7 @@
           <p:cNvPr id="2" name="Title 1">
             <a:extLst>
               <a:ext uri="{FF2B5EF4-FFF2-40B4-BE49-F238E27FC236}">
-                <a16:creationId xmlns:a16="http://schemas.microsoft.com/office/drawing/2014/main" xmlns="" id="{F1EF15B1-1873-4C36-A684-2B8B25594A85}"/>
+                <a16:creationId xmlns="" xmlns:a16="http://schemas.microsoft.com/office/drawing/2014/main" id="{6EA66CEF-80A3-4CFD-A9BB-1C66D281398B}"/>
               </a:ext>
             </a:extLst>
           </p:cNvPr>
@@ -13230,7 +13410,7 @@
           <a:p>
             <a:r>
               <a:rPr lang="en-US"/>
-              <a:t>How to improve performance even further?</a:t>
+              <a:t>More Recent System: TwitterNER</a:t>
             </a:r>
           </a:p>
         </p:txBody>
@@ -13240,7 +13420,7 @@
           <p:cNvPr id="3" name="Content Placeholder 2">
             <a:extLst>
               <a:ext uri="{FF2B5EF4-FFF2-40B4-BE49-F238E27FC236}">
-                <a16:creationId xmlns:a16="http://schemas.microsoft.com/office/drawing/2014/main" xmlns="" id="{2FA6422C-9FED-4D43-9DE4-F348D1C7DD04}"/>
+                <a16:creationId xmlns="" xmlns:a16="http://schemas.microsoft.com/office/drawing/2014/main" id="{BB485482-83E4-4D7B-BC28-ED9C8462CEA9}"/>
               </a:ext>
             </a:extLst>
           </p:cNvPr>
@@ -13251,37 +13431,61 @@
             <p:ph idx="1"/>
           </p:nvPr>
         </p:nvSpPr>
-        <p:spPr>
-          <a:xfrm>
-            <a:off x="628650" y="1699707"/>
-            <a:ext cx="7886700" cy="1250758"/>
-          </a:xfrm>
-        </p:spPr>
-        <p:txBody>
-          <a:bodyPr>
-            <a:normAutofit lnSpcReduction="10000"/>
+        <p:spPr/>
+        <p:txBody>
+          <a:bodyPr/>
+          <a:lstStyle/>
+          <a:p>
+            <a:endParaRPr lang="en-US"/>
+          </a:p>
+        </p:txBody>
+      </p:sp>
+      <p:sp>
+        <p:nvSpPr>
+          <p:cNvPr id="5" name="TextBox 4">
+            <a:extLst>
+              <a:ext uri="{FF2B5EF4-FFF2-40B4-BE49-F238E27FC236}">
+                <a16:creationId xmlns="" xmlns:a16="http://schemas.microsoft.com/office/drawing/2014/main" id="{D6BBBBCF-B341-4F96-8E03-7D7F78D47761}"/>
+              </a:ext>
+            </a:extLst>
+          </p:cNvPr>
+          <p:cNvSpPr txBox="1"/>
+          <p:nvPr/>
+        </p:nvSpPr>
+        <p:spPr>
+          <a:xfrm>
+            <a:off x="6107176" y="6471849"/>
+            <a:ext cx="2961132" cy="307777"/>
+          </a:xfrm>
+          <a:prstGeom prst="rect">
+            <a:avLst/>
+          </a:prstGeom>
+          <a:noFill/>
+        </p:spPr>
+        <p:txBody>
+          <a:bodyPr wrap="square" rtlCol="0">
+            <a:spAutoFit/>
           </a:bodyPr>
           <a:lstStyle/>
           <a:p>
-            <a:r>
-              <a:rPr lang="en-US" sz="2000"/>
-              <a:t>Models can be made more precise by treating each entity type (such as locations) individually i.e. train type-specific models</a:t>
-            </a:r>
-          </a:p>
-          <a:p>
-            <a:r>
-              <a:rPr lang="en-US" sz="2000"/>
-              <a:t>In some instances, entities can be ‘extracted’ despite not being explicitly present in the text (e.g., geotagging)</a:t>
+            <a:pPr algn="r"/>
+            <a:r>
+              <a:rPr lang="en-US" sz="1400">
+                <a:solidFill>
+                  <a:srgbClr val="002060"/>
+                </a:solidFill>
+              </a:rPr>
+              <a:t>(Mishra and Diesner, 2013)</a:t>
             </a:r>
           </a:p>
         </p:txBody>
       </p:sp>
       <p:pic>
         <p:nvPicPr>
-          <p:cNvPr id="5" name="Picture 4">
+          <p:cNvPr id="6" name="Picture 5">
             <a:extLst>
               <a:ext uri="{FF2B5EF4-FFF2-40B4-BE49-F238E27FC236}">
-                <a16:creationId xmlns:a16="http://schemas.microsoft.com/office/drawing/2014/main" xmlns="" id="{81838BC7-3CD4-4E62-A18A-AA14B5C72AA1}"/>
+                <a16:creationId xmlns="" xmlns:a16="http://schemas.microsoft.com/office/drawing/2014/main" id="{B2C808EF-D515-4A45-9CCD-07E40B1F20D9}"/>
               </a:ext>
             </a:extLst>
           </p:cNvPr>
@@ -13291,65 +13495,25 @@
           <p:nvPr/>
         </p:nvPicPr>
         <p:blipFill>
-          <a:blip r:embed="rId2"/>
+          <a:blip r:embed="rId3"/>
           <a:stretch>
             <a:fillRect/>
           </a:stretch>
         </p:blipFill>
         <p:spPr>
           <a:xfrm>
-            <a:off x="238506" y="2957467"/>
-            <a:ext cx="6973824" cy="3812884"/>
+            <a:off x="304800" y="1588770"/>
+            <a:ext cx="8327136" cy="4684014"/>
           </a:xfrm>
           <a:prstGeom prst="rect">
             <a:avLst/>
           </a:prstGeom>
         </p:spPr>
       </p:pic>
-      <p:sp>
-        <p:nvSpPr>
-          <p:cNvPr id="7" name="TextBox 6">
-            <a:extLst>
-              <a:ext uri="{FF2B5EF4-FFF2-40B4-BE49-F238E27FC236}">
-                <a16:creationId xmlns:a16="http://schemas.microsoft.com/office/drawing/2014/main" xmlns="" id="{B68477D6-868B-4AB9-912E-B6282710D329}"/>
-              </a:ext>
-            </a:extLst>
-          </p:cNvPr>
-          <p:cNvSpPr txBox="1"/>
-          <p:nvPr/>
-        </p:nvSpPr>
-        <p:spPr>
-          <a:xfrm>
-            <a:off x="5071872" y="6462574"/>
-            <a:ext cx="4072128" cy="307777"/>
-          </a:xfrm>
-          <a:prstGeom prst="rect">
-            <a:avLst/>
-          </a:prstGeom>
-          <a:noFill/>
-        </p:spPr>
-        <p:txBody>
-          <a:bodyPr wrap="square" rtlCol="0">
-            <a:spAutoFit/>
-          </a:bodyPr>
-          <a:lstStyle/>
-          <a:p>
-            <a:pPr algn="r"/>
-            <a:r>
-              <a:rPr lang="en-US" sz="1400">
-                <a:solidFill>
-                  <a:srgbClr val="002060"/>
-                </a:solidFill>
-              </a:rPr>
-              <a:t>(Middleton, Middleton and Modafferi, 2014)</a:t>
-            </a:r>
-          </a:p>
-        </p:txBody>
-      </p:sp>
     </p:spTree>
     <p:extLst>
       <p:ext uri="{BB962C8B-B14F-4D97-AF65-F5344CB8AC3E}">
-        <p14:creationId xmlns:p14="http://schemas.microsoft.com/office/powerpoint/2010/main" val="4100392418"/>
+        <p14:creationId xmlns:p14="http://schemas.microsoft.com/office/powerpoint/2010/main" val="3725798188"/>
       </p:ext>
     </p:extLst>
   </p:cSld>
@@ -13388,7 +13552,7 @@
           <p:cNvPr id="2" name="Title 1">
             <a:extLst>
               <a:ext uri="{FF2B5EF4-FFF2-40B4-BE49-F238E27FC236}">
-                <a16:creationId xmlns:a16="http://schemas.microsoft.com/office/drawing/2014/main" xmlns="" id="{4B9D2582-8475-4CBA-99BF-EE1B12182165}"/>
+                <a16:creationId xmlns="" xmlns:a16="http://schemas.microsoft.com/office/drawing/2014/main" id="{F1EF15B1-1873-4C36-A684-2B8B25594A85}"/>
               </a:ext>
             </a:extLst>
           </p:cNvPr>
@@ -13399,29 +13563,65 @@
             <p:ph type="title"/>
           </p:nvPr>
         </p:nvSpPr>
-        <p:spPr>
-          <a:xfrm>
-            <a:off x="628650" y="194438"/>
-            <a:ext cx="7886700" cy="1325563"/>
-          </a:xfrm>
-        </p:spPr>
+        <p:spPr/>
         <p:txBody>
           <a:bodyPr/>
           <a:lstStyle/>
           <a:p>
             <a:r>
               <a:rPr lang="en-US"/>
-              <a:t>Example of crisis domain-specific geotagging system</a:t>
+              <a:t>How to Further Improve?</a:t>
+            </a:r>
+          </a:p>
+        </p:txBody>
+      </p:sp>
+      <p:sp>
+        <p:nvSpPr>
+          <p:cNvPr id="3" name="Content Placeholder 2">
+            <a:extLst>
+              <a:ext uri="{FF2B5EF4-FFF2-40B4-BE49-F238E27FC236}">
+                <a16:creationId xmlns="" xmlns:a16="http://schemas.microsoft.com/office/drawing/2014/main" id="{2FA6422C-9FED-4D43-9DE4-F348D1C7DD04}"/>
+              </a:ext>
+            </a:extLst>
+          </p:cNvPr>
+          <p:cNvSpPr>
+            <a:spLocks noGrp="1"/>
+          </p:cNvSpPr>
+          <p:nvPr>
+            <p:ph idx="1"/>
+          </p:nvPr>
+        </p:nvSpPr>
+        <p:spPr>
+          <a:xfrm>
+            <a:off x="628650" y="1699707"/>
+            <a:ext cx="7886700" cy="1250758"/>
+          </a:xfrm>
+        </p:spPr>
+        <p:txBody>
+          <a:bodyPr>
+            <a:normAutofit lnSpcReduction="10000"/>
+          </a:bodyPr>
+          <a:lstStyle/>
+          <a:p>
+            <a:r>
+              <a:rPr lang="en-US" sz="2000"/>
+              <a:t>Models can be made more precise by treating each entity type (such as locations) individually i.e. train type-specific models</a:t>
+            </a:r>
+          </a:p>
+          <a:p>
+            <a:r>
+              <a:rPr lang="en-US" sz="2000"/>
+              <a:t>In some instances, entities can be ‘extracted’ despite not being explicitly present in the text (e.g., geotagging)</a:t>
             </a:r>
           </a:p>
         </p:txBody>
       </p:sp>
       <p:pic>
         <p:nvPicPr>
-          <p:cNvPr id="4" name="Picture 3">
+          <p:cNvPr id="5" name="Picture 4">
             <a:extLst>
               <a:ext uri="{FF2B5EF4-FFF2-40B4-BE49-F238E27FC236}">
-                <a16:creationId xmlns:a16="http://schemas.microsoft.com/office/drawing/2014/main" xmlns="" id="{CE3B137C-E58F-4AC3-8CEF-EC596ECE28A3}"/>
+                <a16:creationId xmlns="" xmlns:a16="http://schemas.microsoft.com/office/drawing/2014/main" id="{81838BC7-3CD4-4E62-A18A-AA14B5C72AA1}"/>
               </a:ext>
             </a:extLst>
           </p:cNvPr>
@@ -13438,8 +13638,8 @@
         </p:blipFill>
         <p:spPr>
           <a:xfrm>
-            <a:off x="146304" y="1589056"/>
-            <a:ext cx="5059174" cy="5039295"/>
+            <a:off x="238506" y="2957467"/>
+            <a:ext cx="6973824" cy="3812884"/>
           </a:xfrm>
           <a:prstGeom prst="rect">
             <a:avLst/>
@@ -13448,10 +13648,10 @@
       </p:pic>
       <p:sp>
         <p:nvSpPr>
-          <p:cNvPr id="5" name="TextBox 4">
+          <p:cNvPr id="7" name="TextBox 6">
             <a:extLst>
               <a:ext uri="{FF2B5EF4-FFF2-40B4-BE49-F238E27FC236}">
-                <a16:creationId xmlns:a16="http://schemas.microsoft.com/office/drawing/2014/main" xmlns="" id="{A33B7534-065D-4816-A9F0-9CCA32AC6182}"/>
+                <a16:creationId xmlns="" xmlns:a16="http://schemas.microsoft.com/office/drawing/2014/main" id="{B68477D6-868B-4AB9-912E-B6282710D329}"/>
               </a:ext>
             </a:extLst>
           </p:cNvPr>
@@ -13460,8 +13660,8 @@
         </p:nvSpPr>
         <p:spPr>
           <a:xfrm>
-            <a:off x="5071872" y="6432186"/>
-            <a:ext cx="4072128" cy="338554"/>
+            <a:off x="5071872" y="6462574"/>
+            <a:ext cx="4072128" cy="307777"/>
           </a:xfrm>
           <a:prstGeom prst="rect">
             <a:avLst/>
@@ -13474,8 +13674,9 @@
           </a:bodyPr>
           <a:lstStyle/>
           <a:p>
-            <a:r>
-              <a:rPr lang="en-US" sz="1600">
+            <a:pPr algn="r"/>
+            <a:r>
+              <a:rPr lang="en-US" sz="1400">
                 <a:solidFill>
                   <a:srgbClr val="002060"/>
                 </a:solidFill>
@@ -13485,180 +13686,10 @@
           </a:p>
         </p:txBody>
       </p:sp>
-      <p:cxnSp>
-        <p:nvCxnSpPr>
-          <p:cNvPr id="7" name="Straight Arrow Connector 6">
-            <a:extLst>
-              <a:ext uri="{FF2B5EF4-FFF2-40B4-BE49-F238E27FC236}">
-                <a16:creationId xmlns:a16="http://schemas.microsoft.com/office/drawing/2014/main" xmlns="" id="{3129CEA3-A89E-4E57-A178-B5D793065B35}"/>
-              </a:ext>
-            </a:extLst>
-          </p:cNvPr>
-          <p:cNvCxnSpPr>
-            <a:cxnSpLocks/>
-          </p:cNvCxnSpPr>
-          <p:nvPr/>
-        </p:nvCxnSpPr>
-        <p:spPr>
-          <a:xfrm flipH="1">
-            <a:off x="1670304" y="2962656"/>
-            <a:ext cx="4523232" cy="1146048"/>
-          </a:xfrm>
-          <a:prstGeom prst="straightConnector1">
-            <a:avLst/>
-          </a:prstGeom>
-          <a:ln>
-            <a:solidFill>
-              <a:srgbClr val="FF0000"/>
-            </a:solidFill>
-            <a:prstDash val="dash"/>
-            <a:tailEnd type="triangle"/>
-          </a:ln>
-        </p:spPr>
-        <p:style>
-          <a:lnRef idx="1">
-            <a:schemeClr val="accent1"/>
-          </a:lnRef>
-          <a:fillRef idx="0">
-            <a:schemeClr val="accent1"/>
-          </a:fillRef>
-          <a:effectRef idx="0">
-            <a:schemeClr val="accent1"/>
-          </a:effectRef>
-          <a:fontRef idx="minor">
-            <a:schemeClr val="tx1"/>
-          </a:fontRef>
-        </p:style>
-      </p:cxnSp>
-      <p:cxnSp>
-        <p:nvCxnSpPr>
-          <p:cNvPr id="8" name="Straight Arrow Connector 7">
-            <a:extLst>
-              <a:ext uri="{FF2B5EF4-FFF2-40B4-BE49-F238E27FC236}">
-                <a16:creationId xmlns:a16="http://schemas.microsoft.com/office/drawing/2014/main" xmlns="" id="{DC6E134F-64B3-46A4-B49E-8DB2D3E500AE}"/>
-              </a:ext>
-            </a:extLst>
-          </p:cNvPr>
-          <p:cNvCxnSpPr>
-            <a:cxnSpLocks/>
-          </p:cNvCxnSpPr>
-          <p:nvPr/>
-        </p:nvCxnSpPr>
-        <p:spPr>
-          <a:xfrm flipH="1">
-            <a:off x="3974592" y="3157728"/>
-            <a:ext cx="2218944" cy="950976"/>
-          </a:xfrm>
-          <a:prstGeom prst="straightConnector1">
-            <a:avLst/>
-          </a:prstGeom>
-          <a:ln>
-            <a:solidFill>
-              <a:srgbClr val="FF0000"/>
-            </a:solidFill>
-            <a:prstDash val="dash"/>
-            <a:tailEnd type="triangle"/>
-          </a:ln>
-        </p:spPr>
-        <p:style>
-          <a:lnRef idx="1">
-            <a:schemeClr val="accent1"/>
-          </a:lnRef>
-          <a:fillRef idx="0">
-            <a:schemeClr val="accent1"/>
-          </a:fillRef>
-          <a:effectRef idx="0">
-            <a:schemeClr val="accent1"/>
-          </a:effectRef>
-          <a:fontRef idx="minor">
-            <a:schemeClr val="tx1"/>
-          </a:fontRef>
-        </p:style>
-      </p:cxnSp>
-      <p:cxnSp>
-        <p:nvCxnSpPr>
-          <p:cNvPr id="12" name="Straight Arrow Connector 11">
-            <a:extLst>
-              <a:ext uri="{FF2B5EF4-FFF2-40B4-BE49-F238E27FC236}">
-                <a16:creationId xmlns:a16="http://schemas.microsoft.com/office/drawing/2014/main" xmlns="" id="{B67DF206-C4E3-46B7-ABF9-506862DBEA57}"/>
-              </a:ext>
-            </a:extLst>
-          </p:cNvPr>
-          <p:cNvCxnSpPr>
-            <a:cxnSpLocks/>
-          </p:cNvCxnSpPr>
-          <p:nvPr/>
-        </p:nvCxnSpPr>
-        <p:spPr>
-          <a:xfrm flipH="1">
-            <a:off x="4096006" y="3352800"/>
-            <a:ext cx="2097530" cy="2212848"/>
-          </a:xfrm>
-          <a:prstGeom prst="straightConnector1">
-            <a:avLst/>
-          </a:prstGeom>
-          <a:ln>
-            <a:solidFill>
-              <a:srgbClr val="FF0000"/>
-            </a:solidFill>
-            <a:prstDash val="dash"/>
-            <a:tailEnd type="triangle"/>
-          </a:ln>
-        </p:spPr>
-        <p:style>
-          <a:lnRef idx="1">
-            <a:schemeClr val="accent1"/>
-          </a:lnRef>
-          <a:fillRef idx="0">
-            <a:schemeClr val="accent1"/>
-          </a:fillRef>
-          <a:effectRef idx="0">
-            <a:schemeClr val="accent1"/>
-          </a:effectRef>
-          <a:fontRef idx="minor">
-            <a:schemeClr val="tx1"/>
-          </a:fontRef>
-        </p:style>
-      </p:cxnSp>
-      <p:sp>
-        <p:nvSpPr>
-          <p:cNvPr id="14" name="TextBox 13">
-            <a:extLst>
-              <a:ext uri="{FF2B5EF4-FFF2-40B4-BE49-F238E27FC236}">
-                <a16:creationId xmlns:a16="http://schemas.microsoft.com/office/drawing/2014/main" xmlns="" id="{0B615D40-23A7-416E-9244-6D7350CAE14D}"/>
-              </a:ext>
-            </a:extLst>
-          </p:cNvPr>
-          <p:cNvSpPr txBox="1"/>
-          <p:nvPr/>
-        </p:nvSpPr>
-        <p:spPr>
-          <a:xfrm>
-            <a:off x="6193536" y="2639490"/>
-            <a:ext cx="2426208" cy="1200329"/>
-          </a:xfrm>
-          <a:prstGeom prst="rect">
-            <a:avLst/>
-          </a:prstGeom>
-          <a:noFill/>
-        </p:spPr>
-        <p:txBody>
-          <a:bodyPr wrap="square" rtlCol="0">
-            <a:spAutoFit/>
-          </a:bodyPr>
-          <a:lstStyle/>
-          <a:p>
-            <a:r>
-              <a:rPr lang="en-US" sz="2400"/>
-              <a:t>Examples of domain-specific components</a:t>
-            </a:r>
-          </a:p>
-        </p:txBody>
-      </p:sp>
     </p:spTree>
     <p:extLst>
       <p:ext uri="{BB962C8B-B14F-4D97-AF65-F5344CB8AC3E}">
-        <p14:creationId xmlns:p14="http://schemas.microsoft.com/office/powerpoint/2010/main" val="2192816161"/>
+        <p14:creationId xmlns:p14="http://schemas.microsoft.com/office/powerpoint/2010/main" val="4100392418"/>
       </p:ext>
     </p:extLst>
   </p:cSld>
@@ -13831,7 +13862,7 @@
           <p:cNvPr id="2" name="Title 1">
             <a:extLst>
               <a:ext uri="{FF2B5EF4-FFF2-40B4-BE49-F238E27FC236}">
-                <a16:creationId xmlns:a16="http://schemas.microsoft.com/office/drawing/2014/main" xmlns="" id="{E1C3A720-E34E-4BB6-B515-B3C2EF039BC8}"/>
+                <a16:creationId xmlns="" xmlns:a16="http://schemas.microsoft.com/office/drawing/2014/main" id="{4B9D2582-8475-4CBA-99BF-EE1B12182165}"/>
               </a:ext>
             </a:extLst>
           </p:cNvPr>
@@ -13842,6 +13873,315 @@
             <p:ph type="title"/>
           </p:nvPr>
         </p:nvSpPr>
+        <p:spPr>
+          <a:xfrm>
+            <a:off x="628650" y="194438"/>
+            <a:ext cx="7886700" cy="1325563"/>
+          </a:xfrm>
+        </p:spPr>
+        <p:txBody>
+          <a:bodyPr/>
+          <a:lstStyle/>
+          <a:p>
+            <a:r>
+              <a:rPr lang="en-US"/>
+              <a:t>Example of crisis domain-specific geotagging system</a:t>
+            </a:r>
+          </a:p>
+        </p:txBody>
+      </p:sp>
+      <p:pic>
+        <p:nvPicPr>
+          <p:cNvPr id="4" name="Picture 3">
+            <a:extLst>
+              <a:ext uri="{FF2B5EF4-FFF2-40B4-BE49-F238E27FC236}">
+                <a16:creationId xmlns="" xmlns:a16="http://schemas.microsoft.com/office/drawing/2014/main" id="{CE3B137C-E58F-4AC3-8CEF-EC596ECE28A3}"/>
+              </a:ext>
+            </a:extLst>
+          </p:cNvPr>
+          <p:cNvPicPr>
+            <a:picLocks noChangeAspect="1"/>
+          </p:cNvPicPr>
+          <p:nvPr/>
+        </p:nvPicPr>
+        <p:blipFill>
+          <a:blip r:embed="rId2"/>
+          <a:stretch>
+            <a:fillRect/>
+          </a:stretch>
+        </p:blipFill>
+        <p:spPr>
+          <a:xfrm>
+            <a:off x="146304" y="1589056"/>
+            <a:ext cx="5059174" cy="5039295"/>
+          </a:xfrm>
+          <a:prstGeom prst="rect">
+            <a:avLst/>
+          </a:prstGeom>
+        </p:spPr>
+      </p:pic>
+      <p:sp>
+        <p:nvSpPr>
+          <p:cNvPr id="5" name="TextBox 4">
+            <a:extLst>
+              <a:ext uri="{FF2B5EF4-FFF2-40B4-BE49-F238E27FC236}">
+                <a16:creationId xmlns="" xmlns:a16="http://schemas.microsoft.com/office/drawing/2014/main" id="{A33B7534-065D-4816-A9F0-9CCA32AC6182}"/>
+              </a:ext>
+            </a:extLst>
+          </p:cNvPr>
+          <p:cNvSpPr txBox="1"/>
+          <p:nvPr/>
+        </p:nvSpPr>
+        <p:spPr>
+          <a:xfrm>
+            <a:off x="5700613" y="6474462"/>
+            <a:ext cx="3412053" cy="307777"/>
+          </a:xfrm>
+          <a:prstGeom prst="rect">
+            <a:avLst/>
+          </a:prstGeom>
+          <a:noFill/>
+        </p:spPr>
+        <p:txBody>
+          <a:bodyPr wrap="square" rtlCol="0">
+            <a:spAutoFit/>
+          </a:bodyPr>
+          <a:lstStyle/>
+          <a:p>
+            <a:r>
+              <a:rPr lang="en-US" sz="1400">
+                <a:solidFill>
+                  <a:srgbClr val="002060"/>
+                </a:solidFill>
+              </a:rPr>
+              <a:t>(Middleton, Middleton and Modafferi, 2014)</a:t>
+            </a:r>
+          </a:p>
+        </p:txBody>
+      </p:sp>
+      <p:cxnSp>
+        <p:nvCxnSpPr>
+          <p:cNvPr id="7" name="Straight Arrow Connector 6">
+            <a:extLst>
+              <a:ext uri="{FF2B5EF4-FFF2-40B4-BE49-F238E27FC236}">
+                <a16:creationId xmlns="" xmlns:a16="http://schemas.microsoft.com/office/drawing/2014/main" id="{3129CEA3-A89E-4E57-A178-B5D793065B35}"/>
+              </a:ext>
+            </a:extLst>
+          </p:cNvPr>
+          <p:cNvCxnSpPr>
+            <a:cxnSpLocks/>
+          </p:cNvCxnSpPr>
+          <p:nvPr/>
+        </p:nvCxnSpPr>
+        <p:spPr>
+          <a:xfrm flipH="1">
+            <a:off x="1670304" y="2962656"/>
+            <a:ext cx="4523232" cy="1146048"/>
+          </a:xfrm>
+          <a:prstGeom prst="straightConnector1">
+            <a:avLst/>
+          </a:prstGeom>
+          <a:ln>
+            <a:solidFill>
+              <a:srgbClr val="FF0000"/>
+            </a:solidFill>
+            <a:prstDash val="dash"/>
+            <a:tailEnd type="triangle"/>
+          </a:ln>
+        </p:spPr>
+        <p:style>
+          <a:lnRef idx="1">
+            <a:schemeClr val="accent1"/>
+          </a:lnRef>
+          <a:fillRef idx="0">
+            <a:schemeClr val="accent1"/>
+          </a:fillRef>
+          <a:effectRef idx="0">
+            <a:schemeClr val="accent1"/>
+          </a:effectRef>
+          <a:fontRef idx="minor">
+            <a:schemeClr val="tx1"/>
+          </a:fontRef>
+        </p:style>
+      </p:cxnSp>
+      <p:cxnSp>
+        <p:nvCxnSpPr>
+          <p:cNvPr id="8" name="Straight Arrow Connector 7">
+            <a:extLst>
+              <a:ext uri="{FF2B5EF4-FFF2-40B4-BE49-F238E27FC236}">
+                <a16:creationId xmlns="" xmlns:a16="http://schemas.microsoft.com/office/drawing/2014/main" id="{DC6E134F-64B3-46A4-B49E-8DB2D3E500AE}"/>
+              </a:ext>
+            </a:extLst>
+          </p:cNvPr>
+          <p:cNvCxnSpPr>
+            <a:cxnSpLocks/>
+          </p:cNvCxnSpPr>
+          <p:nvPr/>
+        </p:nvCxnSpPr>
+        <p:spPr>
+          <a:xfrm flipH="1">
+            <a:off x="3974592" y="3157728"/>
+            <a:ext cx="2218944" cy="950976"/>
+          </a:xfrm>
+          <a:prstGeom prst="straightConnector1">
+            <a:avLst/>
+          </a:prstGeom>
+          <a:ln>
+            <a:solidFill>
+              <a:srgbClr val="FF0000"/>
+            </a:solidFill>
+            <a:prstDash val="dash"/>
+            <a:tailEnd type="triangle"/>
+          </a:ln>
+        </p:spPr>
+        <p:style>
+          <a:lnRef idx="1">
+            <a:schemeClr val="accent1"/>
+          </a:lnRef>
+          <a:fillRef idx="0">
+            <a:schemeClr val="accent1"/>
+          </a:fillRef>
+          <a:effectRef idx="0">
+            <a:schemeClr val="accent1"/>
+          </a:effectRef>
+          <a:fontRef idx="minor">
+            <a:schemeClr val="tx1"/>
+          </a:fontRef>
+        </p:style>
+      </p:cxnSp>
+      <p:cxnSp>
+        <p:nvCxnSpPr>
+          <p:cNvPr id="12" name="Straight Arrow Connector 11">
+            <a:extLst>
+              <a:ext uri="{FF2B5EF4-FFF2-40B4-BE49-F238E27FC236}">
+                <a16:creationId xmlns="" xmlns:a16="http://schemas.microsoft.com/office/drawing/2014/main" id="{B67DF206-C4E3-46B7-ABF9-506862DBEA57}"/>
+              </a:ext>
+            </a:extLst>
+          </p:cNvPr>
+          <p:cNvCxnSpPr>
+            <a:cxnSpLocks/>
+          </p:cNvCxnSpPr>
+          <p:nvPr/>
+        </p:nvCxnSpPr>
+        <p:spPr>
+          <a:xfrm flipH="1">
+            <a:off x="4096006" y="3352800"/>
+            <a:ext cx="2097530" cy="2212848"/>
+          </a:xfrm>
+          <a:prstGeom prst="straightConnector1">
+            <a:avLst/>
+          </a:prstGeom>
+          <a:ln>
+            <a:solidFill>
+              <a:srgbClr val="FF0000"/>
+            </a:solidFill>
+            <a:prstDash val="dash"/>
+            <a:tailEnd type="triangle"/>
+          </a:ln>
+        </p:spPr>
+        <p:style>
+          <a:lnRef idx="1">
+            <a:schemeClr val="accent1"/>
+          </a:lnRef>
+          <a:fillRef idx="0">
+            <a:schemeClr val="accent1"/>
+          </a:fillRef>
+          <a:effectRef idx="0">
+            <a:schemeClr val="accent1"/>
+          </a:effectRef>
+          <a:fontRef idx="minor">
+            <a:schemeClr val="tx1"/>
+          </a:fontRef>
+        </p:style>
+      </p:cxnSp>
+      <p:sp>
+        <p:nvSpPr>
+          <p:cNvPr id="14" name="TextBox 13">
+            <a:extLst>
+              <a:ext uri="{FF2B5EF4-FFF2-40B4-BE49-F238E27FC236}">
+                <a16:creationId xmlns="" xmlns:a16="http://schemas.microsoft.com/office/drawing/2014/main" id="{0B615D40-23A7-416E-9244-6D7350CAE14D}"/>
+              </a:ext>
+            </a:extLst>
+          </p:cNvPr>
+          <p:cNvSpPr txBox="1"/>
+          <p:nvPr/>
+        </p:nvSpPr>
+        <p:spPr>
+          <a:xfrm>
+            <a:off x="6193536" y="2639490"/>
+            <a:ext cx="2426208" cy="1200329"/>
+          </a:xfrm>
+          <a:prstGeom prst="rect">
+            <a:avLst/>
+          </a:prstGeom>
+          <a:noFill/>
+        </p:spPr>
+        <p:txBody>
+          <a:bodyPr wrap="square" rtlCol="0">
+            <a:spAutoFit/>
+          </a:bodyPr>
+          <a:lstStyle/>
+          <a:p>
+            <a:r>
+              <a:rPr lang="en-US" sz="2400"/>
+              <a:t>Examples of domain-specific components</a:t>
+            </a:r>
+          </a:p>
+        </p:txBody>
+      </p:sp>
+    </p:spTree>
+    <p:extLst>
+      <p:ext uri="{BB962C8B-B14F-4D97-AF65-F5344CB8AC3E}">
+        <p14:creationId xmlns:p14="http://schemas.microsoft.com/office/powerpoint/2010/main" val="2192816161"/>
+      </p:ext>
+    </p:extLst>
+  </p:cSld>
+  <p:clrMapOvr>
+    <a:masterClrMapping/>
+  </p:clrMapOvr>
+  <p:timing>
+    <p:tnLst>
+      <p:par>
+        <p:cTn id="1" dur="indefinite" restart="never" nodeType="tmRoot"/>
+      </p:par>
+    </p:tnLst>
+  </p:timing>
+</p:sld>
+</file>
+
+<file path=ppt/slides/slide31.xml><?xml version="1.0" encoding="utf-8"?>
+<p:sld xmlns:a="http://schemas.openxmlformats.org/drawingml/2006/main" xmlns:r="http://schemas.openxmlformats.org/officeDocument/2006/relationships" xmlns:p="http://schemas.openxmlformats.org/presentationml/2006/main">
+  <p:cSld>
+    <p:spTree>
+      <p:nvGrpSpPr>
+        <p:cNvPr id="1" name=""/>
+        <p:cNvGrpSpPr/>
+        <p:nvPr/>
+      </p:nvGrpSpPr>
+      <p:grpSpPr>
+        <a:xfrm>
+          <a:off x="0" y="0"/>
+          <a:ext cx="0" cy="0"/>
+          <a:chOff x="0" y="0"/>
+          <a:chExt cx="0" cy="0"/>
+        </a:xfrm>
+      </p:grpSpPr>
+      <p:sp>
+        <p:nvSpPr>
+          <p:cNvPr id="2" name="Title 1">
+            <a:extLst>
+              <a:ext uri="{FF2B5EF4-FFF2-40B4-BE49-F238E27FC236}">
+                <a16:creationId xmlns="" xmlns:a16="http://schemas.microsoft.com/office/drawing/2014/main" id="{E1C3A720-E34E-4BB6-B515-B3C2EF039BC8}"/>
+              </a:ext>
+            </a:extLst>
+          </p:cNvPr>
+          <p:cNvSpPr>
+            <a:spLocks noGrp="1"/>
+          </p:cNvSpPr>
+          <p:nvPr>
+            <p:ph type="title"/>
+          </p:nvPr>
+        </p:nvSpPr>
         <p:spPr/>
         <p:txBody>
           <a:bodyPr/>
@@ -13859,7 +14199,7 @@
           <p:cNvPr id="3" name="Content Placeholder 2">
             <a:extLst>
               <a:ext uri="{FF2B5EF4-FFF2-40B4-BE49-F238E27FC236}">
-                <a16:creationId xmlns:a16="http://schemas.microsoft.com/office/drawing/2014/main" xmlns="" id="{D16B1CA5-8025-464F-80E9-9942274912F8}"/>
+                <a16:creationId xmlns="" xmlns:a16="http://schemas.microsoft.com/office/drawing/2014/main" id="{D16B1CA5-8025-464F-80E9-9942274912F8}"/>
               </a:ext>
             </a:extLst>
           </p:cNvPr>
@@ -13878,13 +14218,24 @@
         </p:spPr>
         <p:txBody>
           <a:bodyPr>
-            <a:normAutofit fontScale="85000" lnSpcReduction="20000"/>
+            <a:normAutofit/>
           </a:bodyPr>
           <a:lstStyle/>
           <a:p>
             <a:r>
               <a:rPr lang="en-US"/>
-              <a:t>Accuracy still low for social media (SM) NER, how to improve performance without increasing training annotations?</a:t>
+              <a:t>Accuracy still low for social media (SM) NER</a:t>
+            </a:r>
+          </a:p>
+          <a:p>
+            <a:pPr lvl="1"/>
+            <a:r>
+              <a:rPr lang="en-US"/>
+              <a:t>H</a:t>
+            </a:r>
+            <a:r>
+              <a:rPr lang="en-US"/>
+              <a:t>ow to improve performance without increasing training annotations?</a:t>
             </a:r>
           </a:p>
           <a:p>
@@ -13904,38 +14255,6 @@
             <a:r>
               <a:rPr lang="en-US"/>
               <a:t>Chinese social media (He and Sun, AAAI’17)</a:t>
-            </a:r>
-          </a:p>
-          <a:p>
-            <a:r>
-              <a:rPr lang="en-US"/>
-              <a:t>How to leverage external contexts such as URLs in tweets, images, multi-modal signals, entity linking to sources like DBpedia...?</a:t>
-            </a:r>
-          </a:p>
-          <a:p>
-            <a:pPr lvl="1"/>
-            <a:r>
-              <a:rPr lang="en-US"/>
-              <a:t>Can significantly enhance the ‘signal’ in the data e.g., see (Gattani et al., VLDB’13)</a:t>
-            </a:r>
-          </a:p>
-          <a:p>
-            <a:r>
-              <a:rPr lang="en-US"/>
-              <a:t>How to combine NER and event identification/extraction models by leveraging joint context?</a:t>
-            </a:r>
-          </a:p>
-          <a:p>
-            <a:pPr lvl="1"/>
-            <a:r>
-              <a:rPr lang="en-US"/>
-              <a:t>Promising work in this area e.g., (Vavliakis et al., DKE, 13)</a:t>
-            </a:r>
-          </a:p>
-          <a:p>
-            <a:r>
-              <a:rPr lang="en-US"/>
-              <a:t>Novel applications and interfaces for crisis informatics pipelines</a:t>
             </a:r>
           </a:p>
         </p:txBody>
@@ -13944,6 +14263,132 @@
     <p:extLst>
       <p:ext uri="{BB962C8B-B14F-4D97-AF65-F5344CB8AC3E}">
         <p14:creationId xmlns:p14="http://schemas.microsoft.com/office/powerpoint/2010/main" val="3352456993"/>
+      </p:ext>
+    </p:extLst>
+  </p:cSld>
+  <p:clrMapOvr>
+    <a:masterClrMapping/>
+  </p:clrMapOvr>
+  <p:timing>
+    <p:tnLst>
+      <p:par>
+        <p:cTn id="1" dur="indefinite" restart="never" nodeType="tmRoot"/>
+      </p:par>
+    </p:tnLst>
+  </p:timing>
+</p:sld>
+</file>
+
+<file path=ppt/slides/slide32.xml><?xml version="1.0" encoding="utf-8"?>
+<p:sld xmlns:a="http://schemas.openxmlformats.org/drawingml/2006/main" xmlns:r="http://schemas.openxmlformats.org/officeDocument/2006/relationships" xmlns:p="http://schemas.openxmlformats.org/presentationml/2006/main">
+  <p:cSld>
+    <p:spTree>
+      <p:nvGrpSpPr>
+        <p:cNvPr id="1" name=""/>
+        <p:cNvGrpSpPr/>
+        <p:nvPr/>
+      </p:nvGrpSpPr>
+      <p:grpSpPr>
+        <a:xfrm>
+          <a:off x="0" y="0"/>
+          <a:ext cx="0" cy="0"/>
+          <a:chOff x="0" y="0"/>
+          <a:chExt cx="0" cy="0"/>
+        </a:xfrm>
+      </p:grpSpPr>
+      <p:sp>
+        <p:nvSpPr>
+          <p:cNvPr id="2" name="Title 1">
+            <a:extLst>
+              <a:ext uri="{FF2B5EF4-FFF2-40B4-BE49-F238E27FC236}">
+                <a16:creationId xmlns="" xmlns:a16="http://schemas.microsoft.com/office/drawing/2014/main" id="{E1C3A720-E34E-4BB6-B515-B3C2EF039BC8}"/>
+              </a:ext>
+            </a:extLst>
+          </p:cNvPr>
+          <p:cNvSpPr>
+            <a:spLocks noGrp="1"/>
+          </p:cNvSpPr>
+          <p:nvPr>
+            <p:ph type="title"/>
+          </p:nvPr>
+        </p:nvSpPr>
+        <p:spPr/>
+        <p:txBody>
+          <a:bodyPr/>
+          <a:lstStyle/>
+          <a:p>
+            <a:r>
+              <a:rPr lang="en-US"/>
+              <a:t>Open Research Issues</a:t>
+            </a:r>
+          </a:p>
+        </p:txBody>
+      </p:sp>
+      <p:sp>
+        <p:nvSpPr>
+          <p:cNvPr id="3" name="Content Placeholder 2">
+            <a:extLst>
+              <a:ext uri="{FF2B5EF4-FFF2-40B4-BE49-F238E27FC236}">
+                <a16:creationId xmlns="" xmlns:a16="http://schemas.microsoft.com/office/drawing/2014/main" id="{D16B1CA5-8025-464F-80E9-9942274912F8}"/>
+              </a:ext>
+            </a:extLst>
+          </p:cNvPr>
+          <p:cNvSpPr>
+            <a:spLocks noGrp="1"/>
+          </p:cNvSpPr>
+          <p:nvPr>
+            <p:ph idx="1"/>
+          </p:nvPr>
+        </p:nvSpPr>
+        <p:spPr>
+          <a:xfrm>
+            <a:off x="292608" y="1487424"/>
+            <a:ext cx="8222742" cy="5181600"/>
+          </a:xfrm>
+        </p:spPr>
+        <p:txBody>
+          <a:bodyPr>
+            <a:normAutofit/>
+          </a:bodyPr>
+          <a:lstStyle/>
+          <a:p>
+            <a:r>
+              <a:rPr lang="en-US"/>
+              <a:t>How to leverage external contexts such as URLs in tweets, images, multi-modal signals, entity linking to sources like DBpedia...?</a:t>
+            </a:r>
+          </a:p>
+          <a:p>
+            <a:pPr lvl="1"/>
+            <a:r>
+              <a:rPr lang="en-US"/>
+              <a:t>Can significantly enhance the ‘signal’ in the data e.g., see (Gattani et al., VLDB’13)</a:t>
+            </a:r>
+          </a:p>
+          <a:p>
+            <a:r>
+              <a:rPr lang="en-US"/>
+              <a:t>How to combine NER and event identification/extraction models by leveraging joint context?</a:t>
+            </a:r>
+          </a:p>
+          <a:p>
+            <a:pPr lvl="1"/>
+            <a:r>
+              <a:rPr lang="en-US"/>
+              <a:t>Promising work in this area e.g., (Vavliakis et al., DKE, 13)</a:t>
+            </a:r>
+          </a:p>
+          <a:p>
+            <a:r>
+              <a:rPr lang="en-US"/>
+              <a:t>Novel applications and interfaces for crisis informatics pipelines</a:t>
+            </a:r>
+          </a:p>
+        </p:txBody>
+      </p:sp>
+    </p:spTree>
+    <p:extLst>
+      <p:ext uri="{BB962C8B-B14F-4D97-AF65-F5344CB8AC3E}">
+        <p14:creationId xmlns:p14="http://schemas.microsoft.com/office/powerpoint/2010/main" val="615786252"/>
       </p:ext>
     </p:extLst>
   </p:cSld>

</xml_diff>